<commit_message>
Describe problem in presentation
- describe logistics app with Trucks
- describe the need for Ship support

---
Test:
open FactoryMethod/Presentation/FactoryMethod.pptx

Signed-off-by: Polina Shlepakova <polinashlepakova@gmail.com>
</commit_message>
<xml_diff>
--- a/FactoryMethod/Presentation/FactoryMethod.pptx
+++ b/FactoryMethod/Presentation/FactoryMethod.pptx
@@ -4,9 +4,15 @@
   <p:sldMasterIdLst>
     <p:sldMasterId id="2147483660" r:id="rId1"/>
   </p:sldMasterIdLst>
+  <p:notesMasterIdLst>
+    <p:notesMasterId r:id="rId7"/>
+  </p:notesMasterIdLst>
   <p:sldIdLst>
     <p:sldId id="256" r:id="rId2"/>
     <p:sldId id="257" r:id="rId3"/>
+    <p:sldId id="258" r:id="rId4"/>
+    <p:sldId id="260" r:id="rId5"/>
+    <p:sldId id="259" r:id="rId6"/>
   </p:sldIdLst>
   <p:sldSz cx="9144000" cy="6858000" type="screen4x3"/>
   <p:notesSz cx="6858000" cy="9144000"/>
@@ -108,6 +114,695 @@
 </p:presentation>
 </file>
 
+<file path=ppt/notesMasters/notesMaster1.xml><?xml version="1.0" encoding="utf-8"?>
+<p:notesMaster xmlns:a="http://schemas.openxmlformats.org/drawingml/2006/main" xmlns:r="http://schemas.openxmlformats.org/officeDocument/2006/relationships" xmlns:p="http://schemas.openxmlformats.org/presentationml/2006/main">
+  <p:cSld>
+    <p:bg>
+      <p:bgRef idx="1001">
+        <a:schemeClr val="bg1"/>
+      </p:bgRef>
+    </p:bg>
+    <p:spTree>
+      <p:nvGrpSpPr>
+        <p:cNvPr id="1" name=""/>
+        <p:cNvGrpSpPr/>
+        <p:nvPr/>
+      </p:nvGrpSpPr>
+      <p:grpSpPr>
+        <a:xfrm>
+          <a:off x="0" y="0"/>
+          <a:ext cx="0" cy="0"/>
+          <a:chOff x="0" y="0"/>
+          <a:chExt cx="0" cy="0"/>
+        </a:xfrm>
+      </p:grpSpPr>
+      <p:sp>
+        <p:nvSpPr>
+          <p:cNvPr id="2" name="Верхний колонтитул 1"/>
+          <p:cNvSpPr>
+            <a:spLocks noGrp="1"/>
+          </p:cNvSpPr>
+          <p:nvPr>
+            <p:ph type="hdr" sz="quarter"/>
+          </p:nvPr>
+        </p:nvSpPr>
+        <p:spPr>
+          <a:xfrm>
+            <a:off x="0" y="0"/>
+            <a:ext cx="2971800" cy="457200"/>
+          </a:xfrm>
+          <a:prstGeom prst="rect">
+            <a:avLst/>
+          </a:prstGeom>
+        </p:spPr>
+        <p:txBody>
+          <a:bodyPr vert="horz" lIns="91440" tIns="45720" rIns="91440" bIns="45720" rtlCol="0"/>
+          <a:lstStyle>
+            <a:lvl1pPr algn="l">
+              <a:defRPr sz="1200"/>
+            </a:lvl1pPr>
+          </a:lstStyle>
+          <a:p>
+            <a:endParaRPr lang="ru-RU"/>
+          </a:p>
+        </p:txBody>
+      </p:sp>
+      <p:sp>
+        <p:nvSpPr>
+          <p:cNvPr id="3" name="Дата 2"/>
+          <p:cNvSpPr>
+            <a:spLocks noGrp="1"/>
+          </p:cNvSpPr>
+          <p:nvPr>
+            <p:ph type="dt" idx="1"/>
+          </p:nvPr>
+        </p:nvSpPr>
+        <p:spPr>
+          <a:xfrm>
+            <a:off x="3884613" y="0"/>
+            <a:ext cx="2971800" cy="457200"/>
+          </a:xfrm>
+          <a:prstGeom prst="rect">
+            <a:avLst/>
+          </a:prstGeom>
+        </p:spPr>
+        <p:txBody>
+          <a:bodyPr vert="horz" lIns="91440" tIns="45720" rIns="91440" bIns="45720" rtlCol="0"/>
+          <a:lstStyle>
+            <a:lvl1pPr algn="r">
+              <a:defRPr sz="1200"/>
+            </a:lvl1pPr>
+          </a:lstStyle>
+          <a:p>
+            <a:fld id="{97342D85-8564-4232-8964-43D3492D4C90}" type="datetimeFigureOut">
+              <a:rPr lang="ru-RU" smtClean="0"/>
+              <a:t>16.02.2019</a:t>
+            </a:fld>
+            <a:endParaRPr lang="ru-RU"/>
+          </a:p>
+        </p:txBody>
+      </p:sp>
+      <p:sp>
+        <p:nvSpPr>
+          <p:cNvPr id="4" name="Образ слайда 3"/>
+          <p:cNvSpPr>
+            <a:spLocks noGrp="1" noRot="1" noChangeAspect="1"/>
+          </p:cNvSpPr>
+          <p:nvPr>
+            <p:ph type="sldImg" idx="2"/>
+          </p:nvPr>
+        </p:nvSpPr>
+        <p:spPr>
+          <a:xfrm>
+            <a:off x="1143000" y="685800"/>
+            <a:ext cx="4572000" cy="3429000"/>
+          </a:xfrm>
+          <a:prstGeom prst="rect">
+            <a:avLst/>
+          </a:prstGeom>
+          <a:noFill/>
+          <a:ln w="12700">
+            <a:solidFill>
+              <a:prstClr val="black"/>
+            </a:solidFill>
+          </a:ln>
+        </p:spPr>
+        <p:txBody>
+          <a:bodyPr vert="horz" lIns="91440" tIns="45720" rIns="91440" bIns="45720" rtlCol="0" anchor="ctr"/>
+          <a:lstStyle/>
+          <a:p>
+            <a:endParaRPr lang="ru-RU"/>
+          </a:p>
+        </p:txBody>
+      </p:sp>
+      <p:sp>
+        <p:nvSpPr>
+          <p:cNvPr id="5" name="Заметки 4"/>
+          <p:cNvSpPr>
+            <a:spLocks noGrp="1"/>
+          </p:cNvSpPr>
+          <p:nvPr>
+            <p:ph type="body" sz="quarter" idx="3"/>
+          </p:nvPr>
+        </p:nvSpPr>
+        <p:spPr>
+          <a:xfrm>
+            <a:off x="685800" y="4343400"/>
+            <a:ext cx="5486400" cy="4114800"/>
+          </a:xfrm>
+          <a:prstGeom prst="rect">
+            <a:avLst/>
+          </a:prstGeom>
+        </p:spPr>
+        <p:txBody>
+          <a:bodyPr vert="horz" lIns="91440" tIns="45720" rIns="91440" bIns="45720" rtlCol="0"/>
+          <a:lstStyle/>
+          <a:p>
+            <a:pPr lvl="0"/>
+            <a:r>
+              <a:rPr lang="ru-RU" smtClean="0"/>
+              <a:t>Образец текста</a:t>
+            </a:r>
+          </a:p>
+          <a:p>
+            <a:pPr lvl="1"/>
+            <a:r>
+              <a:rPr lang="ru-RU" smtClean="0"/>
+              <a:t>Второй уровень</a:t>
+            </a:r>
+          </a:p>
+          <a:p>
+            <a:pPr lvl="2"/>
+            <a:r>
+              <a:rPr lang="ru-RU" smtClean="0"/>
+              <a:t>Третий уровень</a:t>
+            </a:r>
+          </a:p>
+          <a:p>
+            <a:pPr lvl="3"/>
+            <a:r>
+              <a:rPr lang="ru-RU" smtClean="0"/>
+              <a:t>Четвертый уровень</a:t>
+            </a:r>
+          </a:p>
+          <a:p>
+            <a:pPr lvl="4"/>
+            <a:r>
+              <a:rPr lang="ru-RU" smtClean="0"/>
+              <a:t>Пятый уровень</a:t>
+            </a:r>
+            <a:endParaRPr lang="ru-RU"/>
+          </a:p>
+        </p:txBody>
+      </p:sp>
+      <p:sp>
+        <p:nvSpPr>
+          <p:cNvPr id="6" name="Нижний колонтитул 5"/>
+          <p:cNvSpPr>
+            <a:spLocks noGrp="1"/>
+          </p:cNvSpPr>
+          <p:nvPr>
+            <p:ph type="ftr" sz="quarter" idx="4"/>
+          </p:nvPr>
+        </p:nvSpPr>
+        <p:spPr>
+          <a:xfrm>
+            <a:off x="0" y="8685213"/>
+            <a:ext cx="2971800" cy="457200"/>
+          </a:xfrm>
+          <a:prstGeom prst="rect">
+            <a:avLst/>
+          </a:prstGeom>
+        </p:spPr>
+        <p:txBody>
+          <a:bodyPr vert="horz" lIns="91440" tIns="45720" rIns="91440" bIns="45720" rtlCol="0" anchor="b"/>
+          <a:lstStyle>
+            <a:lvl1pPr algn="l">
+              <a:defRPr sz="1200"/>
+            </a:lvl1pPr>
+          </a:lstStyle>
+          <a:p>
+            <a:endParaRPr lang="ru-RU"/>
+          </a:p>
+        </p:txBody>
+      </p:sp>
+      <p:sp>
+        <p:nvSpPr>
+          <p:cNvPr id="7" name="Номер слайда 6"/>
+          <p:cNvSpPr>
+            <a:spLocks noGrp="1"/>
+          </p:cNvSpPr>
+          <p:nvPr>
+            <p:ph type="sldNum" sz="quarter" idx="5"/>
+          </p:nvPr>
+        </p:nvSpPr>
+        <p:spPr>
+          <a:xfrm>
+            <a:off x="3884613" y="8685213"/>
+            <a:ext cx="2971800" cy="457200"/>
+          </a:xfrm>
+          <a:prstGeom prst="rect">
+            <a:avLst/>
+          </a:prstGeom>
+        </p:spPr>
+        <p:txBody>
+          <a:bodyPr vert="horz" lIns="91440" tIns="45720" rIns="91440" bIns="45720" rtlCol="0" anchor="b"/>
+          <a:lstStyle>
+            <a:lvl1pPr algn="r">
+              <a:defRPr sz="1200"/>
+            </a:lvl1pPr>
+          </a:lstStyle>
+          <a:p>
+            <a:fld id="{3C13BA1D-EAE5-4AF1-B42B-5DC5A6D09AB1}" type="slidenum">
+              <a:rPr lang="ru-RU" smtClean="0"/>
+              <a:t>‹#›</a:t>
+            </a:fld>
+            <a:endParaRPr lang="ru-RU"/>
+          </a:p>
+        </p:txBody>
+      </p:sp>
+    </p:spTree>
+    <p:extLst>
+      <p:ext uri="{BB962C8B-B14F-4D97-AF65-F5344CB8AC3E}">
+        <p14:creationId xmlns:p14="http://schemas.microsoft.com/office/powerpoint/2010/main" val="3638418440"/>
+      </p:ext>
+    </p:extLst>
+  </p:cSld>
+  <p:clrMap bg1="lt1" tx1="dk1" bg2="lt2" tx2="dk2" accent1="accent1" accent2="accent2" accent3="accent3" accent4="accent4" accent5="accent5" accent6="accent6" hlink="hlink" folHlink="folHlink"/>
+  <p:notesStyle>
+    <a:lvl1pPr marL="0" algn="l" defTabSz="914400" rtl="0" eaLnBrk="1" latinLnBrk="0" hangingPunct="1">
+      <a:defRPr sz="1200" kern="1200">
+        <a:solidFill>
+          <a:schemeClr val="tx1"/>
+        </a:solidFill>
+        <a:latin typeface="+mn-lt"/>
+        <a:ea typeface="+mn-ea"/>
+        <a:cs typeface="+mn-cs"/>
+      </a:defRPr>
+    </a:lvl1pPr>
+    <a:lvl2pPr marL="457200" algn="l" defTabSz="914400" rtl="0" eaLnBrk="1" latinLnBrk="0" hangingPunct="1">
+      <a:defRPr sz="1200" kern="1200">
+        <a:solidFill>
+          <a:schemeClr val="tx1"/>
+        </a:solidFill>
+        <a:latin typeface="+mn-lt"/>
+        <a:ea typeface="+mn-ea"/>
+        <a:cs typeface="+mn-cs"/>
+      </a:defRPr>
+    </a:lvl2pPr>
+    <a:lvl3pPr marL="914400" algn="l" defTabSz="914400" rtl="0" eaLnBrk="1" latinLnBrk="0" hangingPunct="1">
+      <a:defRPr sz="1200" kern="1200">
+        <a:solidFill>
+          <a:schemeClr val="tx1"/>
+        </a:solidFill>
+        <a:latin typeface="+mn-lt"/>
+        <a:ea typeface="+mn-ea"/>
+        <a:cs typeface="+mn-cs"/>
+      </a:defRPr>
+    </a:lvl3pPr>
+    <a:lvl4pPr marL="1371600" algn="l" defTabSz="914400" rtl="0" eaLnBrk="1" latinLnBrk="0" hangingPunct="1">
+      <a:defRPr sz="1200" kern="1200">
+        <a:solidFill>
+          <a:schemeClr val="tx1"/>
+        </a:solidFill>
+        <a:latin typeface="+mn-lt"/>
+        <a:ea typeface="+mn-ea"/>
+        <a:cs typeface="+mn-cs"/>
+      </a:defRPr>
+    </a:lvl4pPr>
+    <a:lvl5pPr marL="1828800" algn="l" defTabSz="914400" rtl="0" eaLnBrk="1" latinLnBrk="0" hangingPunct="1">
+      <a:defRPr sz="1200" kern="1200">
+        <a:solidFill>
+          <a:schemeClr val="tx1"/>
+        </a:solidFill>
+        <a:latin typeface="+mn-lt"/>
+        <a:ea typeface="+mn-ea"/>
+        <a:cs typeface="+mn-cs"/>
+      </a:defRPr>
+    </a:lvl5pPr>
+    <a:lvl6pPr marL="2286000" algn="l" defTabSz="914400" rtl="0" eaLnBrk="1" latinLnBrk="0" hangingPunct="1">
+      <a:defRPr sz="1200" kern="1200">
+        <a:solidFill>
+          <a:schemeClr val="tx1"/>
+        </a:solidFill>
+        <a:latin typeface="+mn-lt"/>
+        <a:ea typeface="+mn-ea"/>
+        <a:cs typeface="+mn-cs"/>
+      </a:defRPr>
+    </a:lvl6pPr>
+    <a:lvl7pPr marL="2743200" algn="l" defTabSz="914400" rtl="0" eaLnBrk="1" latinLnBrk="0" hangingPunct="1">
+      <a:defRPr sz="1200" kern="1200">
+        <a:solidFill>
+          <a:schemeClr val="tx1"/>
+        </a:solidFill>
+        <a:latin typeface="+mn-lt"/>
+        <a:ea typeface="+mn-ea"/>
+        <a:cs typeface="+mn-cs"/>
+      </a:defRPr>
+    </a:lvl7pPr>
+    <a:lvl8pPr marL="3200400" algn="l" defTabSz="914400" rtl="0" eaLnBrk="1" latinLnBrk="0" hangingPunct="1">
+      <a:defRPr sz="1200" kern="1200">
+        <a:solidFill>
+          <a:schemeClr val="tx1"/>
+        </a:solidFill>
+        <a:latin typeface="+mn-lt"/>
+        <a:ea typeface="+mn-ea"/>
+        <a:cs typeface="+mn-cs"/>
+      </a:defRPr>
+    </a:lvl8pPr>
+    <a:lvl9pPr marL="3657600" algn="l" defTabSz="914400" rtl="0" eaLnBrk="1" latinLnBrk="0" hangingPunct="1">
+      <a:defRPr sz="1200" kern="1200">
+        <a:solidFill>
+          <a:schemeClr val="tx1"/>
+        </a:solidFill>
+        <a:latin typeface="+mn-lt"/>
+        <a:ea typeface="+mn-ea"/>
+        <a:cs typeface="+mn-cs"/>
+      </a:defRPr>
+    </a:lvl9pPr>
+  </p:notesStyle>
+</p:notesMaster>
+</file>
+
+<file path=ppt/notesSlides/notesSlide1.xml><?xml version="1.0" encoding="utf-8"?>
+<p:notes xmlns:a="http://schemas.openxmlformats.org/drawingml/2006/main" xmlns:r="http://schemas.openxmlformats.org/officeDocument/2006/relationships" xmlns:p="http://schemas.openxmlformats.org/presentationml/2006/main">
+  <p:cSld>
+    <p:spTree>
+      <p:nvGrpSpPr>
+        <p:cNvPr id="1" name=""/>
+        <p:cNvGrpSpPr/>
+        <p:nvPr/>
+      </p:nvGrpSpPr>
+      <p:grpSpPr>
+        <a:xfrm>
+          <a:off x="0" y="0"/>
+          <a:ext cx="0" cy="0"/>
+          <a:chOff x="0" y="0"/>
+          <a:chExt cx="0" cy="0"/>
+        </a:xfrm>
+      </p:grpSpPr>
+      <p:sp>
+        <p:nvSpPr>
+          <p:cNvPr id="2" name="Образ слайда 1"/>
+          <p:cNvSpPr>
+            <a:spLocks noGrp="1" noRot="1" noChangeAspect="1"/>
+          </p:cNvSpPr>
+          <p:nvPr>
+            <p:ph type="sldImg"/>
+          </p:nvPr>
+        </p:nvSpPr>
+        <p:spPr/>
+      </p:sp>
+      <p:sp>
+        <p:nvSpPr>
+          <p:cNvPr id="3" name="Заметки 2"/>
+          <p:cNvSpPr>
+            <a:spLocks noGrp="1"/>
+          </p:cNvSpPr>
+          <p:nvPr>
+            <p:ph type="body" idx="1"/>
+          </p:nvPr>
+        </p:nvSpPr>
+        <p:spPr/>
+        <p:txBody>
+          <a:bodyPr/>
+          <a:lstStyle/>
+          <a:p>
+            <a:r>
+              <a:rPr lang="uk-UA" smtClean="0"/>
+              <a:t>Розглянемо зв’язок Фабричного</a:t>
+            </a:r>
+            <a:r>
+              <a:rPr lang="uk-UA" baseline="0" smtClean="0"/>
+              <a:t> методу з іншими патернами на прикладі фрагменту «Карти патернів» з книги Банди Чотирьох.</a:t>
+            </a:r>
+          </a:p>
+          <a:p>
+            <a:r>
+              <a:rPr lang="uk-UA" baseline="0" smtClean="0"/>
+              <a:t>Шаблонний метод нерідко використовує Фабричний метод.</a:t>
+            </a:r>
+          </a:p>
+          <a:p>
+            <a:r>
+              <a:rPr lang="uk-UA" baseline="0" smtClean="0"/>
+              <a:t>Класи Абстрактної фабрики частіше за все реалізовані за допомогою Фабричних методів.</a:t>
+            </a:r>
+          </a:p>
+          <a:p>
+            <a:endParaRPr lang="uk-UA" baseline="0" smtClean="0"/>
+          </a:p>
+          <a:p>
+            <a:r>
+              <a:rPr lang="uk-UA" baseline="0" smtClean="0"/>
+              <a:t>(буде розглянуто детальніше трохи пізніше)</a:t>
+            </a:r>
+          </a:p>
+        </p:txBody>
+      </p:sp>
+      <p:sp>
+        <p:nvSpPr>
+          <p:cNvPr id="4" name="Номер слайда 3"/>
+          <p:cNvSpPr>
+            <a:spLocks noGrp="1"/>
+          </p:cNvSpPr>
+          <p:nvPr>
+            <p:ph type="sldNum" sz="quarter" idx="10"/>
+          </p:nvPr>
+        </p:nvSpPr>
+        <p:spPr/>
+        <p:txBody>
+          <a:bodyPr/>
+          <a:lstStyle/>
+          <a:p>
+            <a:fld id="{3C13BA1D-EAE5-4AF1-B42B-5DC5A6D09AB1}" type="slidenum">
+              <a:rPr lang="ru-RU" smtClean="0"/>
+              <a:t>2</a:t>
+            </a:fld>
+            <a:endParaRPr lang="ru-RU"/>
+          </a:p>
+        </p:txBody>
+      </p:sp>
+    </p:spTree>
+    <p:extLst>
+      <p:ext uri="{BB962C8B-B14F-4D97-AF65-F5344CB8AC3E}">
+        <p14:creationId xmlns:p14="http://schemas.microsoft.com/office/powerpoint/2010/main" val="3299521242"/>
+      </p:ext>
+    </p:extLst>
+  </p:cSld>
+  <p:clrMapOvr>
+    <a:masterClrMapping/>
+  </p:clrMapOvr>
+</p:notes>
+</file>
+
+<file path=ppt/notesSlides/notesSlide2.xml><?xml version="1.0" encoding="utf-8"?>
+<p:notes xmlns:a="http://schemas.openxmlformats.org/drawingml/2006/main" xmlns:r="http://schemas.openxmlformats.org/officeDocument/2006/relationships" xmlns:p="http://schemas.openxmlformats.org/presentationml/2006/main">
+  <p:cSld>
+    <p:spTree>
+      <p:nvGrpSpPr>
+        <p:cNvPr id="1" name=""/>
+        <p:cNvGrpSpPr/>
+        <p:nvPr/>
+      </p:nvGrpSpPr>
+      <p:grpSpPr>
+        <a:xfrm>
+          <a:off x="0" y="0"/>
+          <a:ext cx="0" cy="0"/>
+          <a:chOff x="0" y="0"/>
+          <a:chExt cx="0" cy="0"/>
+        </a:xfrm>
+      </p:grpSpPr>
+      <p:sp>
+        <p:nvSpPr>
+          <p:cNvPr id="2" name="Образ слайда 1"/>
+          <p:cNvSpPr>
+            <a:spLocks noGrp="1" noRot="1" noChangeAspect="1"/>
+          </p:cNvSpPr>
+          <p:nvPr>
+            <p:ph type="sldImg"/>
+          </p:nvPr>
+        </p:nvSpPr>
+        <p:spPr/>
+      </p:sp>
+      <p:sp>
+        <p:nvSpPr>
+          <p:cNvPr id="3" name="Заметки 2"/>
+          <p:cNvSpPr>
+            <a:spLocks noGrp="1"/>
+          </p:cNvSpPr>
+          <p:nvPr>
+            <p:ph type="body" idx="1"/>
+          </p:nvPr>
+        </p:nvSpPr>
+        <p:spPr/>
+        <p:txBody>
+          <a:bodyPr/>
+          <a:lstStyle/>
+          <a:p>
+            <a:r>
+              <a:rPr lang="uk-UA" smtClean="0"/>
+              <a:t>Уявіть,</a:t>
+            </a:r>
+            <a:r>
+              <a:rPr lang="uk-UA" baseline="0" smtClean="0"/>
+              <a:t> що ви працюєте проектим менеджером в </a:t>
+            </a:r>
+            <a:r>
+              <a:rPr lang="en-US" baseline="0" smtClean="0"/>
+              <a:t>IT </a:t>
+            </a:r>
+            <a:r>
+              <a:rPr lang="uk-UA" baseline="0" smtClean="0"/>
+              <a:t>компанії. До вас приходить клієнт, і каже, що його компанія займається вантажними перевезеннями на автомобілях, і йому потрібне застосування, яке б контролювало цей процес.</a:t>
+            </a:r>
+          </a:p>
+          <a:p>
+            <a:endParaRPr lang="uk-UA" baseline="0" smtClean="0"/>
+          </a:p>
+          <a:p>
+            <a:r>
+              <a:rPr lang="uk-UA" baseline="0" smtClean="0"/>
+              <a:t>Ви, як розумний проектний менеджер, питаєте, чи використовує компанія замовника ще щось крім вантажних машин для перевезень, і чи планують в майбутньому. Замовник запевняє вас, що ні, і навіть не планують.</a:t>
+            </a:r>
+          </a:p>
+          <a:p>
+            <a:endParaRPr lang="uk-UA" baseline="0" smtClean="0"/>
+          </a:p>
+          <a:p>
+            <a:r>
+              <a:rPr lang="uk-UA" baseline="0" smtClean="0"/>
+              <a:t>Тому ви створюєте архітектуру, яка напряму використовує клас </a:t>
+            </a:r>
+            <a:r>
+              <a:rPr lang="uk-UA" b="0" i="1" baseline="0" smtClean="0">
+                <a:latin typeface="Courier New" panose="02070309020205020404" pitchFamily="49" charset="0"/>
+                <a:cs typeface="Courier New" panose="02070309020205020404" pitchFamily="49" charset="0"/>
+              </a:rPr>
+              <a:t>Вантажна машина</a:t>
+            </a:r>
+            <a:r>
+              <a:rPr lang="en-US" b="0" i="0" baseline="0" smtClean="0">
+                <a:latin typeface="Courier New" panose="02070309020205020404" pitchFamily="49" charset="0"/>
+                <a:cs typeface="Courier New" panose="02070309020205020404" pitchFamily="49" charset="0"/>
+              </a:rPr>
+              <a:t>. </a:t>
+            </a:r>
+            <a:endParaRPr lang="ru-RU" b="0" i="1">
+              <a:latin typeface="Courier New" panose="02070309020205020404" pitchFamily="49" charset="0"/>
+              <a:cs typeface="Courier New" panose="02070309020205020404" pitchFamily="49" charset="0"/>
+            </a:endParaRPr>
+          </a:p>
+        </p:txBody>
+      </p:sp>
+      <p:sp>
+        <p:nvSpPr>
+          <p:cNvPr id="4" name="Номер слайда 3"/>
+          <p:cNvSpPr>
+            <a:spLocks noGrp="1"/>
+          </p:cNvSpPr>
+          <p:nvPr>
+            <p:ph type="sldNum" sz="quarter" idx="10"/>
+          </p:nvPr>
+        </p:nvSpPr>
+        <p:spPr/>
+        <p:txBody>
+          <a:bodyPr/>
+          <a:lstStyle/>
+          <a:p>
+            <a:fld id="{3C13BA1D-EAE5-4AF1-B42B-5DC5A6D09AB1}" type="slidenum">
+              <a:rPr lang="ru-RU" smtClean="0"/>
+              <a:t>3</a:t>
+            </a:fld>
+            <a:endParaRPr lang="ru-RU"/>
+          </a:p>
+        </p:txBody>
+      </p:sp>
+    </p:spTree>
+    <p:extLst>
+      <p:ext uri="{BB962C8B-B14F-4D97-AF65-F5344CB8AC3E}">
+        <p14:creationId xmlns:p14="http://schemas.microsoft.com/office/powerpoint/2010/main" val="1890852798"/>
+      </p:ext>
+    </p:extLst>
+  </p:cSld>
+  <p:clrMapOvr>
+    <a:masterClrMapping/>
+  </p:clrMapOvr>
+</p:notes>
+</file>
+
+<file path=ppt/notesSlides/notesSlide3.xml><?xml version="1.0" encoding="utf-8"?>
+<p:notes xmlns:a="http://schemas.openxmlformats.org/drawingml/2006/main" xmlns:r="http://schemas.openxmlformats.org/officeDocument/2006/relationships" xmlns:p="http://schemas.openxmlformats.org/presentationml/2006/main">
+  <p:cSld>
+    <p:spTree>
+      <p:nvGrpSpPr>
+        <p:cNvPr id="1" name=""/>
+        <p:cNvGrpSpPr/>
+        <p:nvPr/>
+      </p:nvGrpSpPr>
+      <p:grpSpPr>
+        <a:xfrm>
+          <a:off x="0" y="0"/>
+          <a:ext cx="0" cy="0"/>
+          <a:chOff x="0" y="0"/>
+          <a:chExt cx="0" cy="0"/>
+        </a:xfrm>
+      </p:grpSpPr>
+      <p:sp>
+        <p:nvSpPr>
+          <p:cNvPr id="2" name="Образ слайда 1"/>
+          <p:cNvSpPr>
+            <a:spLocks noGrp="1" noRot="1" noChangeAspect="1"/>
+          </p:cNvSpPr>
+          <p:nvPr>
+            <p:ph type="sldImg"/>
+          </p:nvPr>
+        </p:nvSpPr>
+        <p:spPr/>
+      </p:sp>
+      <p:sp>
+        <p:nvSpPr>
+          <p:cNvPr id="3" name="Заметки 2"/>
+          <p:cNvSpPr>
+            <a:spLocks noGrp="1"/>
+          </p:cNvSpPr>
+          <p:nvPr>
+            <p:ph type="body" idx="1"/>
+          </p:nvPr>
+        </p:nvSpPr>
+        <p:spPr/>
+        <p:txBody>
+          <a:bodyPr/>
+          <a:lstStyle/>
+          <a:p>
+            <a:r>
+              <a:rPr lang="uk-UA" smtClean="0"/>
+              <a:t>Проходить півроку.</a:t>
+            </a:r>
+            <a:r>
+              <a:rPr lang="uk-UA" baseline="0" smtClean="0"/>
+              <a:t> Замовник знову приходить до вас, щасливий. Каже, що знайшов спонсорів, і тепер вони хочуть перевозити вантажі ще на Кораблях, і просить вас внести зміни у програму.</a:t>
+            </a:r>
+            <a:endParaRPr lang="ru-RU"/>
+          </a:p>
+        </p:txBody>
+      </p:sp>
+      <p:sp>
+        <p:nvSpPr>
+          <p:cNvPr id="4" name="Номер слайда 3"/>
+          <p:cNvSpPr>
+            <a:spLocks noGrp="1"/>
+          </p:cNvSpPr>
+          <p:nvPr>
+            <p:ph type="sldNum" sz="quarter" idx="10"/>
+          </p:nvPr>
+        </p:nvSpPr>
+        <p:spPr/>
+        <p:txBody>
+          <a:bodyPr/>
+          <a:lstStyle/>
+          <a:p>
+            <a:fld id="{3C13BA1D-EAE5-4AF1-B42B-5DC5A6D09AB1}" type="slidenum">
+              <a:rPr lang="ru-RU" smtClean="0"/>
+              <a:t>4</a:t>
+            </a:fld>
+            <a:endParaRPr lang="ru-RU"/>
+          </a:p>
+        </p:txBody>
+      </p:sp>
+    </p:spTree>
+    <p:extLst>
+      <p:ext uri="{BB962C8B-B14F-4D97-AF65-F5344CB8AC3E}">
+        <p14:creationId xmlns:p14="http://schemas.microsoft.com/office/powerpoint/2010/main" val="2768605303"/>
+      </p:ext>
+    </p:extLst>
+  </p:cSld>
+  <p:clrMapOvr>
+    <a:masterClrMapping/>
+  </p:clrMapOvr>
+</p:notes>
+</file>
+
 <file path=ppt/slideLayouts/slideLayout1.xml><?xml version="1.0" encoding="utf-8"?>
 <p:sldLayout xmlns:a="http://schemas.openxmlformats.org/drawingml/2006/main" xmlns:r="http://schemas.openxmlformats.org/officeDocument/2006/relationships" xmlns:p="http://schemas.openxmlformats.org/presentationml/2006/main" type="title" preserve="1">
   <p:cSld name="Титульный слайд">
@@ -296,7 +991,7 @@
           <a:p>
             <a:fld id="{B4C71EC6-210F-42DE-9C53-41977AD35B3D}" type="datetimeFigureOut">
               <a:rPr lang="ru-RU" smtClean="0"/>
-              <a:t>12.02.2019</a:t>
+              <a:t>16.02.2019</a:t>
             </a:fld>
             <a:endParaRPr lang="ru-RU"/>
           </a:p>
@@ -496,7 +1191,7 @@
           <a:p>
             <a:fld id="{B4C71EC6-210F-42DE-9C53-41977AD35B3D}" type="datetimeFigureOut">
               <a:rPr lang="ru-RU" smtClean="0"/>
-              <a:t>12.02.2019</a:t>
+              <a:t>16.02.2019</a:t>
             </a:fld>
             <a:endParaRPr lang="ru-RU"/>
           </a:p>
@@ -671,7 +1366,7 @@
           <a:p>
             <a:fld id="{B4C71EC6-210F-42DE-9C53-41977AD35B3D}" type="datetimeFigureOut">
               <a:rPr lang="ru-RU" smtClean="0"/>
-              <a:t>12.02.2019</a:t>
+              <a:t>16.02.2019</a:t>
             </a:fld>
             <a:endParaRPr lang="ru-RU"/>
           </a:p>
@@ -836,7 +1531,7 @@
           <a:p>
             <a:fld id="{B4C71EC6-210F-42DE-9C53-41977AD35B3D}" type="datetimeFigureOut">
               <a:rPr lang="ru-RU" smtClean="0"/>
-              <a:t>12.02.2019</a:t>
+              <a:t>16.02.2019</a:t>
             </a:fld>
             <a:endParaRPr lang="ru-RU"/>
           </a:p>
@@ -1084,7 +1779,7 @@
           <a:p>
             <a:fld id="{B4C71EC6-210F-42DE-9C53-41977AD35B3D}" type="datetimeFigureOut">
               <a:rPr lang="ru-RU" smtClean="0"/>
-              <a:t>12.02.2019</a:t>
+              <a:t>16.02.2019</a:t>
             </a:fld>
             <a:endParaRPr lang="ru-RU"/>
           </a:p>
@@ -1402,7 +2097,7 @@
           <a:p>
             <a:fld id="{B4C71EC6-210F-42DE-9C53-41977AD35B3D}" type="datetimeFigureOut">
               <a:rPr lang="ru-RU" smtClean="0"/>
-              <a:t>12.02.2019</a:t>
+              <a:t>16.02.2019</a:t>
             </a:fld>
             <a:endParaRPr lang="ru-RU"/>
           </a:p>
@@ -1868,7 +2563,7 @@
           <a:p>
             <a:fld id="{B4C71EC6-210F-42DE-9C53-41977AD35B3D}" type="datetimeFigureOut">
               <a:rPr lang="ru-RU" smtClean="0"/>
-              <a:t>12.02.2019</a:t>
+              <a:t>16.02.2019</a:t>
             </a:fld>
             <a:endParaRPr lang="ru-RU"/>
           </a:p>
@@ -2016,7 +2711,7 @@
           <a:p>
             <a:fld id="{B4C71EC6-210F-42DE-9C53-41977AD35B3D}" type="datetimeFigureOut">
               <a:rPr lang="ru-RU" smtClean="0"/>
-              <a:t>12.02.2019</a:t>
+              <a:t>16.02.2019</a:t>
             </a:fld>
             <a:endParaRPr lang="ru-RU"/>
           </a:p>
@@ -2106,7 +2801,7 @@
           <a:p>
             <a:fld id="{B4C71EC6-210F-42DE-9C53-41977AD35B3D}" type="datetimeFigureOut">
               <a:rPr lang="ru-RU" smtClean="0"/>
-              <a:t>12.02.2019</a:t>
+              <a:t>16.02.2019</a:t>
             </a:fld>
             <a:endParaRPr lang="ru-RU"/>
           </a:p>
@@ -2380,7 +3075,7 @@
           <a:p>
             <a:fld id="{B4C71EC6-210F-42DE-9C53-41977AD35B3D}" type="datetimeFigureOut">
               <a:rPr lang="ru-RU" smtClean="0"/>
-              <a:t>12.02.2019</a:t>
+              <a:t>16.02.2019</a:t>
             </a:fld>
             <a:endParaRPr lang="ru-RU"/>
           </a:p>
@@ -2685,7 +3380,7 @@
           <a:p>
             <a:fld id="{B4C71EC6-210F-42DE-9C53-41977AD35B3D}" type="datetimeFigureOut">
               <a:rPr lang="ru-RU" smtClean="0"/>
-              <a:t>12.02.2019</a:t>
+              <a:t>16.02.2019</a:t>
             </a:fld>
             <a:endParaRPr lang="ru-RU"/>
           </a:p>
@@ -2983,7 +3678,7 @@
           <a:p>
             <a:fld id="{B4C71EC6-210F-42DE-9C53-41977AD35B3D}" type="datetimeFigureOut">
               <a:rPr lang="ru-RU" smtClean="0"/>
-              <a:t>12.02.2019</a:t>
+              <a:t>16.02.2019</a:t>
             </a:fld>
             <a:endParaRPr lang="ru-RU"/>
           </a:p>
@@ -3639,12 +4334,968 @@
           <a:p>
             <a:r>
               <a:rPr lang="en-US" smtClean="0"/>
-              <a:t>Topic</a:t>
+              <a:t>Pattern map</a:t>
             </a:r>
             <a:endParaRPr lang="ru-RU"/>
           </a:p>
         </p:txBody>
       </p:sp>
+      <p:pic>
+        <p:nvPicPr>
+          <p:cNvPr id="5" name="Объект 4"/>
+          <p:cNvPicPr>
+            <a:picLocks noGrp="1" noChangeAspect="1"/>
+          </p:cNvPicPr>
+          <p:nvPr>
+            <p:ph idx="1"/>
+          </p:nvPr>
+        </p:nvPicPr>
+        <p:blipFill>
+          <a:blip r:embed="rId3" cstate="print">
+            <a:extLst>
+              <a:ext uri="{28A0092B-C50C-407E-A947-70E740481C1C}">
+                <a14:useLocalDpi xmlns:a14="http://schemas.microsoft.com/office/drawing/2010/main" val="0"/>
+              </a:ext>
+            </a:extLst>
+          </a:blip>
+          <a:stretch>
+            <a:fillRect/>
+          </a:stretch>
+        </p:blipFill>
+        <p:spPr>
+          <a:xfrm>
+            <a:off x="611560" y="1558025"/>
+            <a:ext cx="7355160" cy="4247239"/>
+          </a:xfrm>
+        </p:spPr>
+      </p:pic>
+      <p:sp>
+        <p:nvSpPr>
+          <p:cNvPr id="4" name="TextBox 3"/>
+          <p:cNvSpPr txBox="1"/>
+          <p:nvPr/>
+        </p:nvSpPr>
+        <p:spPr>
+          <a:xfrm>
+            <a:off x="1043608" y="6165304"/>
+            <a:ext cx="8122801" cy="369332"/>
+          </a:xfrm>
+          <a:prstGeom prst="rect">
+            <a:avLst/>
+          </a:prstGeom>
+          <a:noFill/>
+        </p:spPr>
+        <p:txBody>
+          <a:bodyPr wrap="none" rtlCol="0">
+            <a:spAutoFit/>
+          </a:bodyPr>
+          <a:lstStyle/>
+          <a:p>
+            <a:r>
+              <a:rPr lang="en-US" smtClean="0">
+                <a:solidFill>
+                  <a:schemeClr val="accent6">
+                    <a:lumMod val="75000"/>
+                  </a:schemeClr>
+                </a:solidFill>
+              </a:rPr>
+              <a:t>Image source: Design Patterns Explained Simply by Alexander Shvets, pg. 69</a:t>
+            </a:r>
+            <a:endParaRPr lang="en-US" u="sng">
+              <a:solidFill>
+                <a:schemeClr val="accent6">
+                  <a:lumMod val="75000"/>
+                </a:schemeClr>
+              </a:solidFill>
+            </a:endParaRPr>
+          </a:p>
+        </p:txBody>
+      </p:sp>
+      <p:pic>
+        <p:nvPicPr>
+          <p:cNvPr id="6" name="Рисунок 5"/>
+          <p:cNvPicPr>
+            <a:picLocks noChangeAspect="1"/>
+          </p:cNvPicPr>
+          <p:nvPr/>
+        </p:nvPicPr>
+        <p:blipFill>
+          <a:blip r:embed="rId4">
+            <a:extLst>
+              <a:ext uri="{28A0092B-C50C-407E-A947-70E740481C1C}">
+                <a14:useLocalDpi xmlns:a14="http://schemas.microsoft.com/office/drawing/2010/main" val="0"/>
+              </a:ext>
+            </a:extLst>
+          </a:blip>
+          <a:stretch>
+            <a:fillRect/>
+          </a:stretch>
+        </p:blipFill>
+        <p:spPr>
+          <a:xfrm>
+            <a:off x="7540630" y="404665"/>
+            <a:ext cx="1572745" cy="1152127"/>
+          </a:xfrm>
+          <a:prstGeom prst="rect">
+            <a:avLst/>
+          </a:prstGeom>
+        </p:spPr>
+      </p:pic>
+      <p:sp>
+        <p:nvSpPr>
+          <p:cNvPr id="7" name="TextBox 6"/>
+          <p:cNvSpPr txBox="1"/>
+          <p:nvPr/>
+        </p:nvSpPr>
+        <p:spPr>
+          <a:xfrm>
+            <a:off x="2380" y="6516052"/>
+            <a:ext cx="2265364" cy="369332"/>
+          </a:xfrm>
+          <a:prstGeom prst="rect">
+            <a:avLst/>
+          </a:prstGeom>
+          <a:noFill/>
+        </p:spPr>
+        <p:txBody>
+          <a:bodyPr wrap="none" rtlCol="0">
+            <a:spAutoFit/>
+          </a:bodyPr>
+          <a:lstStyle/>
+          <a:p>
+            <a:r>
+              <a:rPr lang="en-US" smtClean="0">
+                <a:solidFill>
+                  <a:schemeClr val="tx2">
+                    <a:lumMod val="75000"/>
+                  </a:schemeClr>
+                </a:solidFill>
+              </a:rPr>
+              <a:t>@PolinaShlepakova</a:t>
+            </a:r>
+            <a:endParaRPr lang="ru-RU">
+              <a:solidFill>
+                <a:schemeClr val="tx2">
+                  <a:lumMod val="75000"/>
+                </a:schemeClr>
+              </a:solidFill>
+            </a:endParaRPr>
+          </a:p>
+        </p:txBody>
+      </p:sp>
+      <p:sp>
+        <p:nvSpPr>
+          <p:cNvPr id="8" name="TextBox 7"/>
+          <p:cNvSpPr txBox="1"/>
+          <p:nvPr/>
+        </p:nvSpPr>
+        <p:spPr>
+          <a:xfrm>
+            <a:off x="4150803" y="6546830"/>
+            <a:ext cx="925253" cy="338554"/>
+          </a:xfrm>
+          <a:prstGeom prst="rect">
+            <a:avLst/>
+          </a:prstGeom>
+          <a:noFill/>
+        </p:spPr>
+        <p:txBody>
+          <a:bodyPr wrap="none" rtlCol="0">
+            <a:spAutoFit/>
+          </a:bodyPr>
+          <a:lstStyle/>
+          <a:p>
+            <a:r>
+              <a:rPr lang="en-US" sz="1600" smtClean="0">
+                <a:solidFill>
+                  <a:schemeClr val="accent4">
+                    <a:lumMod val="75000"/>
+                  </a:schemeClr>
+                </a:solidFill>
+              </a:rPr>
+              <a:t>02.2019</a:t>
+            </a:r>
+            <a:endParaRPr lang="ru-RU" sz="1600">
+              <a:solidFill>
+                <a:schemeClr val="accent4">
+                  <a:lumMod val="75000"/>
+                </a:schemeClr>
+              </a:solidFill>
+            </a:endParaRPr>
+          </a:p>
+        </p:txBody>
+      </p:sp>
+      <p:sp>
+        <p:nvSpPr>
+          <p:cNvPr id="9" name="TextBox 8"/>
+          <p:cNvSpPr txBox="1"/>
+          <p:nvPr/>
+        </p:nvSpPr>
+        <p:spPr>
+          <a:xfrm>
+            <a:off x="8479868" y="6488668"/>
+            <a:ext cx="633507" cy="369332"/>
+          </a:xfrm>
+          <a:prstGeom prst="rect">
+            <a:avLst/>
+          </a:prstGeom>
+          <a:noFill/>
+        </p:spPr>
+        <p:txBody>
+          <a:bodyPr wrap="none" rtlCol="0">
+            <a:spAutoFit/>
+          </a:bodyPr>
+          <a:lstStyle/>
+          <a:p>
+            <a:r>
+              <a:rPr lang="en-US" smtClean="0">
+                <a:solidFill>
+                  <a:srgbClr val="002060"/>
+                </a:solidFill>
+              </a:rPr>
+              <a:t>2/20</a:t>
+            </a:r>
+          </a:p>
+        </p:txBody>
+      </p:sp>
+      <p:sp>
+        <p:nvSpPr>
+          <p:cNvPr id="10" name="TextBox 9"/>
+          <p:cNvSpPr txBox="1"/>
+          <p:nvPr/>
+        </p:nvSpPr>
+        <p:spPr>
+          <a:xfrm>
+            <a:off x="2712075" y="5867980"/>
+            <a:ext cx="6468437" cy="369332"/>
+          </a:xfrm>
+          <a:prstGeom prst="rect">
+            <a:avLst/>
+          </a:prstGeom>
+          <a:noFill/>
+        </p:spPr>
+        <p:txBody>
+          <a:bodyPr wrap="none" rtlCol="0">
+            <a:spAutoFit/>
+          </a:bodyPr>
+          <a:lstStyle/>
+          <a:p>
+            <a:r>
+              <a:rPr lang="en-US" smtClean="0">
+                <a:solidFill>
+                  <a:schemeClr val="accent6">
+                    <a:lumMod val="75000"/>
+                  </a:schemeClr>
+                </a:solidFill>
+              </a:rPr>
+              <a:t>Diagram source</a:t>
+            </a:r>
+            <a:r>
+              <a:rPr lang="en-US" smtClean="0">
+                <a:solidFill>
+                  <a:schemeClr val="accent6">
+                    <a:lumMod val="75000"/>
+                  </a:schemeClr>
+                </a:solidFill>
+              </a:rPr>
+              <a:t>: Fragment of pattern map from the GoF book</a:t>
+            </a:r>
+            <a:endParaRPr lang="en-US" u="sng">
+              <a:solidFill>
+                <a:schemeClr val="accent6">
+                  <a:lumMod val="75000"/>
+                </a:schemeClr>
+              </a:solidFill>
+            </a:endParaRPr>
+          </a:p>
+        </p:txBody>
+      </p:sp>
+    </p:spTree>
+    <p:extLst>
+      <p:ext uri="{BB962C8B-B14F-4D97-AF65-F5344CB8AC3E}">
+        <p14:creationId xmlns:p14="http://schemas.microsoft.com/office/powerpoint/2010/main" val="1186106448"/>
+      </p:ext>
+    </p:extLst>
+  </p:cSld>
+  <p:clrMapOvr>
+    <a:masterClrMapping/>
+  </p:clrMapOvr>
+</p:sld>
+</file>
+
+<file path=ppt/slides/slide3.xml><?xml version="1.0" encoding="utf-8"?>
+<p:sld xmlns:a="http://schemas.openxmlformats.org/drawingml/2006/main" xmlns:r="http://schemas.openxmlformats.org/officeDocument/2006/relationships" xmlns:p="http://schemas.openxmlformats.org/presentationml/2006/main">
+  <p:cSld>
+    <p:spTree>
+      <p:nvGrpSpPr>
+        <p:cNvPr id="1" name=""/>
+        <p:cNvGrpSpPr/>
+        <p:nvPr/>
+      </p:nvGrpSpPr>
+      <p:grpSpPr>
+        <a:xfrm>
+          <a:off x="0" y="0"/>
+          <a:ext cx="0" cy="0"/>
+          <a:chOff x="0" y="0"/>
+          <a:chExt cx="0" cy="0"/>
+        </a:xfrm>
+      </p:grpSpPr>
+      <p:sp>
+        <p:nvSpPr>
+          <p:cNvPr id="2" name="Заголовок 1"/>
+          <p:cNvSpPr>
+            <a:spLocks noGrp="1"/>
+          </p:cNvSpPr>
+          <p:nvPr>
+            <p:ph type="title"/>
+          </p:nvPr>
+        </p:nvSpPr>
+        <p:spPr>
+          <a:xfrm>
+            <a:off x="457200" y="533400"/>
+            <a:ext cx="6779096" cy="990600"/>
+          </a:xfrm>
+        </p:spPr>
+        <p:txBody>
+          <a:bodyPr/>
+          <a:lstStyle/>
+          <a:p>
+            <a:r>
+              <a:rPr lang="en-US" smtClean="0"/>
+              <a:t>Pattern map</a:t>
+            </a:r>
+            <a:endParaRPr lang="ru-RU"/>
+          </a:p>
+        </p:txBody>
+      </p:sp>
+      <p:pic>
+        <p:nvPicPr>
+          <p:cNvPr id="5" name="Объект 4"/>
+          <p:cNvPicPr>
+            <a:picLocks noGrp="1" noChangeAspect="1"/>
+          </p:cNvPicPr>
+          <p:nvPr>
+            <p:ph idx="1"/>
+          </p:nvPr>
+        </p:nvPicPr>
+        <p:blipFill>
+          <a:blip r:embed="rId3">
+            <a:extLst>
+              <a:ext uri="{28A0092B-C50C-407E-A947-70E740481C1C}">
+                <a14:useLocalDpi xmlns:a14="http://schemas.microsoft.com/office/drawing/2010/main" val="0"/>
+              </a:ext>
+            </a:extLst>
+          </a:blip>
+          <a:stretch>
+            <a:fillRect/>
+          </a:stretch>
+        </p:blipFill>
+        <p:spPr>
+          <a:xfrm>
+            <a:off x="2380" y="1916832"/>
+            <a:ext cx="6954221" cy="3705742"/>
+          </a:xfrm>
+        </p:spPr>
+      </p:pic>
+      <p:sp>
+        <p:nvSpPr>
+          <p:cNvPr id="4" name="TextBox 3"/>
+          <p:cNvSpPr txBox="1"/>
+          <p:nvPr/>
+        </p:nvSpPr>
+        <p:spPr>
+          <a:xfrm>
+            <a:off x="1043608" y="6165304"/>
+            <a:ext cx="8122801" cy="369332"/>
+          </a:xfrm>
+          <a:prstGeom prst="rect">
+            <a:avLst/>
+          </a:prstGeom>
+          <a:noFill/>
+        </p:spPr>
+        <p:txBody>
+          <a:bodyPr wrap="none" rtlCol="0">
+            <a:spAutoFit/>
+          </a:bodyPr>
+          <a:lstStyle/>
+          <a:p>
+            <a:r>
+              <a:rPr lang="en-US" smtClean="0">
+                <a:solidFill>
+                  <a:schemeClr val="accent6">
+                    <a:lumMod val="75000"/>
+                  </a:schemeClr>
+                </a:solidFill>
+              </a:rPr>
+              <a:t>Image source: Design Patterns Explained Simply by Alexander Shvets, pg. </a:t>
+            </a:r>
+            <a:r>
+              <a:rPr lang="en-US" smtClean="0">
+                <a:solidFill>
+                  <a:schemeClr val="accent6">
+                    <a:lumMod val="75000"/>
+                  </a:schemeClr>
+                </a:solidFill>
+              </a:rPr>
+              <a:t>70</a:t>
+            </a:r>
+            <a:endParaRPr lang="en-US" u="sng">
+              <a:solidFill>
+                <a:schemeClr val="accent6">
+                  <a:lumMod val="75000"/>
+                </a:schemeClr>
+              </a:solidFill>
+            </a:endParaRPr>
+          </a:p>
+        </p:txBody>
+      </p:sp>
+      <p:pic>
+        <p:nvPicPr>
+          <p:cNvPr id="6" name="Рисунок 5"/>
+          <p:cNvPicPr>
+            <a:picLocks noChangeAspect="1"/>
+          </p:cNvPicPr>
+          <p:nvPr/>
+        </p:nvPicPr>
+        <p:blipFill>
+          <a:blip r:embed="rId4">
+            <a:extLst>
+              <a:ext uri="{28A0092B-C50C-407E-A947-70E740481C1C}">
+                <a14:useLocalDpi xmlns:a14="http://schemas.microsoft.com/office/drawing/2010/main" val="0"/>
+              </a:ext>
+            </a:extLst>
+          </a:blip>
+          <a:stretch>
+            <a:fillRect/>
+          </a:stretch>
+        </p:blipFill>
+        <p:spPr>
+          <a:xfrm>
+            <a:off x="7540630" y="404665"/>
+            <a:ext cx="1572745" cy="1152127"/>
+          </a:xfrm>
+          <a:prstGeom prst="rect">
+            <a:avLst/>
+          </a:prstGeom>
+        </p:spPr>
+      </p:pic>
+      <p:sp>
+        <p:nvSpPr>
+          <p:cNvPr id="7" name="TextBox 6"/>
+          <p:cNvSpPr txBox="1"/>
+          <p:nvPr/>
+        </p:nvSpPr>
+        <p:spPr>
+          <a:xfrm>
+            <a:off x="2380" y="6516052"/>
+            <a:ext cx="2265364" cy="369332"/>
+          </a:xfrm>
+          <a:prstGeom prst="rect">
+            <a:avLst/>
+          </a:prstGeom>
+          <a:noFill/>
+        </p:spPr>
+        <p:txBody>
+          <a:bodyPr wrap="none" rtlCol="0">
+            <a:spAutoFit/>
+          </a:bodyPr>
+          <a:lstStyle/>
+          <a:p>
+            <a:r>
+              <a:rPr lang="en-US" smtClean="0">
+                <a:solidFill>
+                  <a:schemeClr val="tx2">
+                    <a:lumMod val="75000"/>
+                  </a:schemeClr>
+                </a:solidFill>
+              </a:rPr>
+              <a:t>@PolinaShlepakova</a:t>
+            </a:r>
+            <a:endParaRPr lang="ru-RU">
+              <a:solidFill>
+                <a:schemeClr val="tx2">
+                  <a:lumMod val="75000"/>
+                </a:schemeClr>
+              </a:solidFill>
+            </a:endParaRPr>
+          </a:p>
+        </p:txBody>
+      </p:sp>
+      <p:sp>
+        <p:nvSpPr>
+          <p:cNvPr id="8" name="TextBox 7"/>
+          <p:cNvSpPr txBox="1"/>
+          <p:nvPr/>
+        </p:nvSpPr>
+        <p:spPr>
+          <a:xfrm>
+            <a:off x="4150803" y="6546830"/>
+            <a:ext cx="925253" cy="338554"/>
+          </a:xfrm>
+          <a:prstGeom prst="rect">
+            <a:avLst/>
+          </a:prstGeom>
+          <a:noFill/>
+        </p:spPr>
+        <p:txBody>
+          <a:bodyPr wrap="none" rtlCol="0">
+            <a:spAutoFit/>
+          </a:bodyPr>
+          <a:lstStyle/>
+          <a:p>
+            <a:r>
+              <a:rPr lang="en-US" sz="1600" smtClean="0">
+                <a:solidFill>
+                  <a:schemeClr val="accent4">
+                    <a:lumMod val="75000"/>
+                  </a:schemeClr>
+                </a:solidFill>
+              </a:rPr>
+              <a:t>02.2019</a:t>
+            </a:r>
+            <a:endParaRPr lang="ru-RU" sz="1600">
+              <a:solidFill>
+                <a:schemeClr val="accent4">
+                  <a:lumMod val="75000"/>
+                </a:schemeClr>
+              </a:solidFill>
+            </a:endParaRPr>
+          </a:p>
+        </p:txBody>
+      </p:sp>
+      <p:sp>
+        <p:nvSpPr>
+          <p:cNvPr id="9" name="TextBox 8"/>
+          <p:cNvSpPr txBox="1"/>
+          <p:nvPr/>
+        </p:nvSpPr>
+        <p:spPr>
+          <a:xfrm>
+            <a:off x="8479868" y="6488668"/>
+            <a:ext cx="633507" cy="369332"/>
+          </a:xfrm>
+          <a:prstGeom prst="rect">
+            <a:avLst/>
+          </a:prstGeom>
+          <a:noFill/>
+        </p:spPr>
+        <p:txBody>
+          <a:bodyPr wrap="none" rtlCol="0">
+            <a:spAutoFit/>
+          </a:bodyPr>
+          <a:lstStyle/>
+          <a:p>
+            <a:r>
+              <a:rPr lang="en-US">
+                <a:solidFill>
+                  <a:srgbClr val="002060"/>
+                </a:solidFill>
+              </a:rPr>
+              <a:t>3</a:t>
+            </a:r>
+            <a:r>
+              <a:rPr lang="en-US" smtClean="0">
+                <a:solidFill>
+                  <a:srgbClr val="002060"/>
+                </a:solidFill>
+              </a:rPr>
+              <a:t>/20</a:t>
+            </a:r>
+            <a:endParaRPr lang="en-US" smtClean="0">
+              <a:solidFill>
+                <a:srgbClr val="002060"/>
+              </a:solidFill>
+            </a:endParaRPr>
+          </a:p>
+        </p:txBody>
+      </p:sp>
+    </p:spTree>
+    <p:extLst>
+      <p:ext uri="{BB962C8B-B14F-4D97-AF65-F5344CB8AC3E}">
+        <p14:creationId xmlns:p14="http://schemas.microsoft.com/office/powerpoint/2010/main" val="304186812"/>
+      </p:ext>
+    </p:extLst>
+  </p:cSld>
+  <p:clrMapOvr>
+    <a:masterClrMapping/>
+  </p:clrMapOvr>
+</p:sld>
+</file>
+
+<file path=ppt/slides/slide4.xml><?xml version="1.0" encoding="utf-8"?>
+<p:sld xmlns:a="http://schemas.openxmlformats.org/drawingml/2006/main" xmlns:r="http://schemas.openxmlformats.org/officeDocument/2006/relationships" xmlns:p="http://schemas.openxmlformats.org/presentationml/2006/main">
+  <p:cSld>
+    <p:spTree>
+      <p:nvGrpSpPr>
+        <p:cNvPr id="1" name=""/>
+        <p:cNvGrpSpPr/>
+        <p:nvPr/>
+      </p:nvGrpSpPr>
+      <p:grpSpPr>
+        <a:xfrm>
+          <a:off x="0" y="0"/>
+          <a:ext cx="0" cy="0"/>
+          <a:chOff x="0" y="0"/>
+          <a:chExt cx="0" cy="0"/>
+        </a:xfrm>
+      </p:grpSpPr>
+      <p:sp>
+        <p:nvSpPr>
+          <p:cNvPr id="2" name="Заголовок 1"/>
+          <p:cNvSpPr>
+            <a:spLocks noGrp="1"/>
+          </p:cNvSpPr>
+          <p:nvPr>
+            <p:ph type="title"/>
+          </p:nvPr>
+        </p:nvSpPr>
+        <p:spPr>
+          <a:xfrm>
+            <a:off x="457200" y="533400"/>
+            <a:ext cx="6779096" cy="990600"/>
+          </a:xfrm>
+        </p:spPr>
+        <p:txBody>
+          <a:bodyPr/>
+          <a:lstStyle/>
+          <a:p>
+            <a:r>
+              <a:rPr lang="en-US" smtClean="0"/>
+              <a:t>Pattern map</a:t>
+            </a:r>
+            <a:endParaRPr lang="ru-RU"/>
+          </a:p>
+        </p:txBody>
+      </p:sp>
+      <p:pic>
+        <p:nvPicPr>
+          <p:cNvPr id="5" name="Объект 4"/>
+          <p:cNvPicPr>
+            <a:picLocks noGrp="1" noChangeAspect="1"/>
+          </p:cNvPicPr>
+          <p:nvPr>
+            <p:ph idx="1"/>
+          </p:nvPr>
+        </p:nvPicPr>
+        <p:blipFill>
+          <a:blip r:embed="rId3">
+            <a:extLst>
+              <a:ext uri="{28A0092B-C50C-407E-A947-70E740481C1C}">
+                <a14:useLocalDpi xmlns:a14="http://schemas.microsoft.com/office/drawing/2010/main" val="0"/>
+              </a:ext>
+            </a:extLst>
+          </a:blip>
+          <a:stretch>
+            <a:fillRect/>
+          </a:stretch>
+        </p:blipFill>
+        <p:spPr>
+          <a:xfrm>
+            <a:off x="2380" y="1916832"/>
+            <a:ext cx="6954221" cy="3705742"/>
+          </a:xfrm>
+        </p:spPr>
+      </p:pic>
+      <p:sp>
+        <p:nvSpPr>
+          <p:cNvPr id="4" name="TextBox 3"/>
+          <p:cNvSpPr txBox="1"/>
+          <p:nvPr/>
+        </p:nvSpPr>
+        <p:spPr>
+          <a:xfrm>
+            <a:off x="1043608" y="6165304"/>
+            <a:ext cx="8122801" cy="369332"/>
+          </a:xfrm>
+          <a:prstGeom prst="rect">
+            <a:avLst/>
+          </a:prstGeom>
+          <a:noFill/>
+        </p:spPr>
+        <p:txBody>
+          <a:bodyPr wrap="none" rtlCol="0">
+            <a:spAutoFit/>
+          </a:bodyPr>
+          <a:lstStyle/>
+          <a:p>
+            <a:r>
+              <a:rPr lang="en-US" smtClean="0">
+                <a:solidFill>
+                  <a:schemeClr val="accent6">
+                    <a:lumMod val="75000"/>
+                  </a:schemeClr>
+                </a:solidFill>
+              </a:rPr>
+              <a:t>Image source: Design Patterns Explained Simply by Alexander Shvets, pg. </a:t>
+            </a:r>
+            <a:r>
+              <a:rPr lang="en-US" smtClean="0">
+                <a:solidFill>
+                  <a:schemeClr val="accent6">
+                    <a:lumMod val="75000"/>
+                  </a:schemeClr>
+                </a:solidFill>
+              </a:rPr>
+              <a:t>70</a:t>
+            </a:r>
+            <a:endParaRPr lang="en-US" u="sng">
+              <a:solidFill>
+                <a:schemeClr val="accent6">
+                  <a:lumMod val="75000"/>
+                </a:schemeClr>
+              </a:solidFill>
+            </a:endParaRPr>
+          </a:p>
+        </p:txBody>
+      </p:sp>
+      <p:pic>
+        <p:nvPicPr>
+          <p:cNvPr id="6" name="Рисунок 5"/>
+          <p:cNvPicPr>
+            <a:picLocks noChangeAspect="1"/>
+          </p:cNvPicPr>
+          <p:nvPr/>
+        </p:nvPicPr>
+        <p:blipFill>
+          <a:blip r:embed="rId4">
+            <a:extLst>
+              <a:ext uri="{28A0092B-C50C-407E-A947-70E740481C1C}">
+                <a14:useLocalDpi xmlns:a14="http://schemas.microsoft.com/office/drawing/2010/main" val="0"/>
+              </a:ext>
+            </a:extLst>
+          </a:blip>
+          <a:stretch>
+            <a:fillRect/>
+          </a:stretch>
+        </p:blipFill>
+        <p:spPr>
+          <a:xfrm>
+            <a:off x="7540630" y="404665"/>
+            <a:ext cx="1572745" cy="1152127"/>
+          </a:xfrm>
+          <a:prstGeom prst="rect">
+            <a:avLst/>
+          </a:prstGeom>
+        </p:spPr>
+      </p:pic>
+      <p:sp>
+        <p:nvSpPr>
+          <p:cNvPr id="7" name="TextBox 6"/>
+          <p:cNvSpPr txBox="1"/>
+          <p:nvPr/>
+        </p:nvSpPr>
+        <p:spPr>
+          <a:xfrm>
+            <a:off x="2380" y="6516052"/>
+            <a:ext cx="2265364" cy="369332"/>
+          </a:xfrm>
+          <a:prstGeom prst="rect">
+            <a:avLst/>
+          </a:prstGeom>
+          <a:noFill/>
+        </p:spPr>
+        <p:txBody>
+          <a:bodyPr wrap="none" rtlCol="0">
+            <a:spAutoFit/>
+          </a:bodyPr>
+          <a:lstStyle/>
+          <a:p>
+            <a:r>
+              <a:rPr lang="en-US" smtClean="0">
+                <a:solidFill>
+                  <a:schemeClr val="tx2">
+                    <a:lumMod val="75000"/>
+                  </a:schemeClr>
+                </a:solidFill>
+              </a:rPr>
+              <a:t>@PolinaShlepakova</a:t>
+            </a:r>
+            <a:endParaRPr lang="ru-RU">
+              <a:solidFill>
+                <a:schemeClr val="tx2">
+                  <a:lumMod val="75000"/>
+                </a:schemeClr>
+              </a:solidFill>
+            </a:endParaRPr>
+          </a:p>
+        </p:txBody>
+      </p:sp>
+      <p:sp>
+        <p:nvSpPr>
+          <p:cNvPr id="8" name="TextBox 7"/>
+          <p:cNvSpPr txBox="1"/>
+          <p:nvPr/>
+        </p:nvSpPr>
+        <p:spPr>
+          <a:xfrm>
+            <a:off x="4150803" y="6546830"/>
+            <a:ext cx="925253" cy="338554"/>
+          </a:xfrm>
+          <a:prstGeom prst="rect">
+            <a:avLst/>
+          </a:prstGeom>
+          <a:noFill/>
+        </p:spPr>
+        <p:txBody>
+          <a:bodyPr wrap="none" rtlCol="0">
+            <a:spAutoFit/>
+          </a:bodyPr>
+          <a:lstStyle/>
+          <a:p>
+            <a:r>
+              <a:rPr lang="en-US" sz="1600" smtClean="0">
+                <a:solidFill>
+                  <a:schemeClr val="accent4">
+                    <a:lumMod val="75000"/>
+                  </a:schemeClr>
+                </a:solidFill>
+              </a:rPr>
+              <a:t>02.2019</a:t>
+            </a:r>
+            <a:endParaRPr lang="ru-RU" sz="1600">
+              <a:solidFill>
+                <a:schemeClr val="accent4">
+                  <a:lumMod val="75000"/>
+                </a:schemeClr>
+              </a:solidFill>
+            </a:endParaRPr>
+          </a:p>
+        </p:txBody>
+      </p:sp>
+      <p:sp>
+        <p:nvSpPr>
+          <p:cNvPr id="9" name="TextBox 8"/>
+          <p:cNvSpPr txBox="1"/>
+          <p:nvPr/>
+        </p:nvSpPr>
+        <p:spPr>
+          <a:xfrm>
+            <a:off x="8479868" y="6488668"/>
+            <a:ext cx="633507" cy="369332"/>
+          </a:xfrm>
+          <a:prstGeom prst="rect">
+            <a:avLst/>
+          </a:prstGeom>
+          <a:noFill/>
+        </p:spPr>
+        <p:txBody>
+          <a:bodyPr wrap="none" rtlCol="0">
+            <a:spAutoFit/>
+          </a:bodyPr>
+          <a:lstStyle/>
+          <a:p>
+            <a:r>
+              <a:rPr lang="en-US">
+                <a:solidFill>
+                  <a:srgbClr val="002060"/>
+                </a:solidFill>
+              </a:rPr>
+              <a:t>4</a:t>
+            </a:r>
+            <a:r>
+              <a:rPr lang="en-US" smtClean="0">
+                <a:solidFill>
+                  <a:srgbClr val="002060"/>
+                </a:solidFill>
+              </a:rPr>
+              <a:t>/20</a:t>
+            </a:r>
+            <a:endParaRPr lang="en-US" smtClean="0">
+              <a:solidFill>
+                <a:srgbClr val="002060"/>
+              </a:solidFill>
+            </a:endParaRPr>
+          </a:p>
+        </p:txBody>
+      </p:sp>
+      <p:pic>
+        <p:nvPicPr>
+          <p:cNvPr id="10" name="Рисунок 9"/>
+          <p:cNvPicPr>
+            <a:picLocks noChangeAspect="1"/>
+          </p:cNvPicPr>
+          <p:nvPr/>
+        </p:nvPicPr>
+        <p:blipFill>
+          <a:blip r:embed="rId5">
+            <a:extLst>
+              <a:ext uri="{28A0092B-C50C-407E-A947-70E740481C1C}">
+                <a14:useLocalDpi xmlns:a14="http://schemas.microsoft.com/office/drawing/2010/main" val="0"/>
+              </a:ext>
+            </a:extLst>
+          </a:blip>
+          <a:stretch>
+            <a:fillRect/>
+          </a:stretch>
+        </p:blipFill>
+        <p:spPr>
+          <a:xfrm>
+            <a:off x="7149183" y="2348880"/>
+            <a:ext cx="1964192" cy="3024336"/>
+          </a:xfrm>
+          <a:prstGeom prst="rect">
+            <a:avLst/>
+          </a:prstGeom>
+        </p:spPr>
+      </p:pic>
+    </p:spTree>
+    <p:extLst>
+      <p:ext uri="{BB962C8B-B14F-4D97-AF65-F5344CB8AC3E}">
+        <p14:creationId xmlns:p14="http://schemas.microsoft.com/office/powerpoint/2010/main" val="369175606"/>
+      </p:ext>
+    </p:extLst>
+  </p:cSld>
+  <p:clrMapOvr>
+    <a:masterClrMapping/>
+  </p:clrMapOvr>
+</p:sld>
+</file>
+
+<file path=ppt/slides/slide5.xml><?xml version="1.0" encoding="utf-8"?>
+<p:sld xmlns:a="http://schemas.openxmlformats.org/drawingml/2006/main" xmlns:r="http://schemas.openxmlformats.org/officeDocument/2006/relationships" xmlns:p="http://schemas.openxmlformats.org/presentationml/2006/main">
+  <p:cSld>
+    <p:spTree>
+      <p:nvGrpSpPr>
+        <p:cNvPr id="1" name=""/>
+        <p:cNvGrpSpPr/>
+        <p:nvPr/>
+      </p:nvGrpSpPr>
+      <p:grpSpPr>
+        <a:xfrm>
+          <a:off x="0" y="0"/>
+          <a:ext cx="0" cy="0"/>
+          <a:chOff x="0" y="0"/>
+          <a:chExt cx="0" cy="0"/>
+        </a:xfrm>
+      </p:grpSpPr>
+      <p:sp>
+        <p:nvSpPr>
+          <p:cNvPr id="2" name="Заголовок 1"/>
+          <p:cNvSpPr>
+            <a:spLocks noGrp="1"/>
+          </p:cNvSpPr>
+          <p:nvPr>
+            <p:ph type="title"/>
+          </p:nvPr>
+        </p:nvSpPr>
+        <p:spPr>
+          <a:xfrm>
+            <a:off x="457200" y="533400"/>
+            <a:ext cx="6779096" cy="990600"/>
+          </a:xfrm>
+        </p:spPr>
+        <p:txBody>
+          <a:bodyPr/>
+          <a:lstStyle/>
+          <a:p>
+            <a:r>
+              <a:rPr lang="en-US" smtClean="0"/>
+              <a:t>Pattern map</a:t>
+            </a:r>
+            <a:endParaRPr lang="ru-RU"/>
+          </a:p>
+        </p:txBody>
+      </p:sp>
       <p:sp>
         <p:nvSpPr>
           <p:cNvPr id="3" name="Объект 2"/>
@@ -3660,10 +5311,6 @@
           <a:bodyPr/>
           <a:lstStyle/>
           <a:p>
-            <a:r>
-              <a:rPr lang="en-US" smtClean="0"/>
-              <a:t>Blah Blah Blah</a:t>
-            </a:r>
             <a:endParaRPr lang="ru-RU"/>
           </a:p>
         </p:txBody>
@@ -3860,7 +5507,7 @@
     </p:spTree>
     <p:extLst>
       <p:ext uri="{BB962C8B-B14F-4D97-AF65-F5344CB8AC3E}">
-        <p14:creationId xmlns:p14="http://schemas.microsoft.com/office/powerpoint/2010/main" val="1186106448"/>
+        <p14:creationId xmlns:p14="http://schemas.microsoft.com/office/powerpoint/2010/main" val="2320135228"/>
       </p:ext>
     </p:extLst>
   </p:cSld>
@@ -4156,4 +5803,289 @@
   <a:objectDefaults/>
   <a:extraClrSchemeLst/>
 </a:theme>
+</file>
+
+<file path=ppt/theme/theme2.xml><?xml version="1.0" encoding="utf-8"?>
+<a:theme xmlns:a="http://schemas.openxmlformats.org/drawingml/2006/main" name="Тема Office">
+  <a:themeElements>
+    <a:clrScheme name="Стандартная">
+      <a:dk1>
+        <a:sysClr val="windowText" lastClr="000000"/>
+      </a:dk1>
+      <a:lt1>
+        <a:sysClr val="window" lastClr="FFFFFF"/>
+      </a:lt1>
+      <a:dk2>
+        <a:srgbClr val="1F497D"/>
+      </a:dk2>
+      <a:lt2>
+        <a:srgbClr val="EEECE1"/>
+      </a:lt2>
+      <a:accent1>
+        <a:srgbClr val="4F81BD"/>
+      </a:accent1>
+      <a:accent2>
+        <a:srgbClr val="C0504D"/>
+      </a:accent2>
+      <a:accent3>
+        <a:srgbClr val="9BBB59"/>
+      </a:accent3>
+      <a:accent4>
+        <a:srgbClr val="8064A2"/>
+      </a:accent4>
+      <a:accent5>
+        <a:srgbClr val="4BACC6"/>
+      </a:accent5>
+      <a:accent6>
+        <a:srgbClr val="F79646"/>
+      </a:accent6>
+      <a:hlink>
+        <a:srgbClr val="0000FF"/>
+      </a:hlink>
+      <a:folHlink>
+        <a:srgbClr val="800080"/>
+      </a:folHlink>
+    </a:clrScheme>
+    <a:fontScheme name="Стандартная">
+      <a:majorFont>
+        <a:latin typeface="Calibri"/>
+        <a:ea typeface=""/>
+        <a:cs typeface=""/>
+        <a:font script="Jpan" typeface="ＭＳ Ｐゴシック"/>
+        <a:font script="Hang" typeface="맑은 고딕"/>
+        <a:font script="Hans" typeface="宋体"/>
+        <a:font script="Hant" typeface="新細明體"/>
+        <a:font script="Arab" typeface="Times New Roman"/>
+        <a:font script="Hebr" typeface="Times New Roman"/>
+        <a:font script="Thai" typeface="Angsana New"/>
+        <a:font script="Ethi" typeface="Nyala"/>
+        <a:font script="Beng" typeface="Vrinda"/>
+        <a:font script="Gujr" typeface="Shruti"/>
+        <a:font script="Khmr" typeface="MoolBoran"/>
+        <a:font script="Knda" typeface="Tunga"/>
+        <a:font script="Guru" typeface="Raavi"/>
+        <a:font script="Cans" typeface="Euphemia"/>
+        <a:font script="Cher" typeface="Plantagenet Cherokee"/>
+        <a:font script="Yiii" typeface="Microsoft Yi Baiti"/>
+        <a:font script="Tibt" typeface="Microsoft Himalaya"/>
+        <a:font script="Thaa" typeface="MV Boli"/>
+        <a:font script="Deva" typeface="Mangal"/>
+        <a:font script="Telu" typeface="Gautami"/>
+        <a:font script="Taml" typeface="Latha"/>
+        <a:font script="Syrc" typeface="Estrangelo Edessa"/>
+        <a:font script="Orya" typeface="Kalinga"/>
+        <a:font script="Mlym" typeface="Kartika"/>
+        <a:font script="Laoo" typeface="DokChampa"/>
+        <a:font script="Sinh" typeface="Iskoola Pota"/>
+        <a:font script="Mong" typeface="Mongolian Baiti"/>
+        <a:font script="Viet" typeface="Times New Roman"/>
+        <a:font script="Uigh" typeface="Microsoft Uighur"/>
+        <a:font script="Geor" typeface="Sylfaen"/>
+      </a:majorFont>
+      <a:minorFont>
+        <a:latin typeface="Calibri"/>
+        <a:ea typeface=""/>
+        <a:cs typeface=""/>
+        <a:font script="Jpan" typeface="ＭＳ Ｐゴシック"/>
+        <a:font script="Hang" typeface="맑은 고딕"/>
+        <a:font script="Hans" typeface="宋体"/>
+        <a:font script="Hant" typeface="新細明體"/>
+        <a:font script="Arab" typeface="Arial"/>
+        <a:font script="Hebr" typeface="Arial"/>
+        <a:font script="Thai" typeface="Cordia New"/>
+        <a:font script="Ethi" typeface="Nyala"/>
+        <a:font script="Beng" typeface="Vrinda"/>
+        <a:font script="Gujr" typeface="Shruti"/>
+        <a:font script="Khmr" typeface="DaunPenh"/>
+        <a:font script="Knda" typeface="Tunga"/>
+        <a:font script="Guru" typeface="Raavi"/>
+        <a:font script="Cans" typeface="Euphemia"/>
+        <a:font script="Cher" typeface="Plantagenet Cherokee"/>
+        <a:font script="Yiii" typeface="Microsoft Yi Baiti"/>
+        <a:font script="Tibt" typeface="Microsoft Himalaya"/>
+        <a:font script="Thaa" typeface="MV Boli"/>
+        <a:font script="Deva" typeface="Mangal"/>
+        <a:font script="Telu" typeface="Gautami"/>
+        <a:font script="Taml" typeface="Latha"/>
+        <a:font script="Syrc" typeface="Estrangelo Edessa"/>
+        <a:font script="Orya" typeface="Kalinga"/>
+        <a:font script="Mlym" typeface="Kartika"/>
+        <a:font script="Laoo" typeface="DokChampa"/>
+        <a:font script="Sinh" typeface="Iskoola Pota"/>
+        <a:font script="Mong" typeface="Mongolian Baiti"/>
+        <a:font script="Viet" typeface="Arial"/>
+        <a:font script="Uigh" typeface="Microsoft Uighur"/>
+        <a:font script="Geor" typeface="Sylfaen"/>
+      </a:minorFont>
+    </a:fontScheme>
+    <a:fmtScheme name="Стандартная">
+      <a:fillStyleLst>
+        <a:solidFill>
+          <a:schemeClr val="phClr"/>
+        </a:solidFill>
+        <a:gradFill rotWithShape="1">
+          <a:gsLst>
+            <a:gs pos="0">
+              <a:schemeClr val="phClr">
+                <a:tint val="50000"/>
+                <a:satMod val="300000"/>
+              </a:schemeClr>
+            </a:gs>
+            <a:gs pos="35000">
+              <a:schemeClr val="phClr">
+                <a:tint val="37000"/>
+                <a:satMod val="300000"/>
+              </a:schemeClr>
+            </a:gs>
+            <a:gs pos="100000">
+              <a:schemeClr val="phClr">
+                <a:tint val="15000"/>
+                <a:satMod val="350000"/>
+              </a:schemeClr>
+            </a:gs>
+          </a:gsLst>
+          <a:lin ang="16200000" scaled="1"/>
+        </a:gradFill>
+        <a:gradFill rotWithShape="1">
+          <a:gsLst>
+            <a:gs pos="0">
+              <a:schemeClr val="phClr">
+                <a:shade val="51000"/>
+                <a:satMod val="130000"/>
+              </a:schemeClr>
+            </a:gs>
+            <a:gs pos="80000">
+              <a:schemeClr val="phClr">
+                <a:shade val="93000"/>
+                <a:satMod val="130000"/>
+              </a:schemeClr>
+            </a:gs>
+            <a:gs pos="100000">
+              <a:schemeClr val="phClr">
+                <a:shade val="94000"/>
+                <a:satMod val="135000"/>
+              </a:schemeClr>
+            </a:gs>
+          </a:gsLst>
+          <a:lin ang="16200000" scaled="0"/>
+        </a:gradFill>
+      </a:fillStyleLst>
+      <a:lnStyleLst>
+        <a:ln w="9525" cap="flat" cmpd="sng" algn="ctr">
+          <a:solidFill>
+            <a:schemeClr val="phClr">
+              <a:shade val="95000"/>
+              <a:satMod val="105000"/>
+            </a:schemeClr>
+          </a:solidFill>
+          <a:prstDash val="solid"/>
+        </a:ln>
+        <a:ln w="25400" cap="flat" cmpd="sng" algn="ctr">
+          <a:solidFill>
+            <a:schemeClr val="phClr"/>
+          </a:solidFill>
+          <a:prstDash val="solid"/>
+        </a:ln>
+        <a:ln w="38100" cap="flat" cmpd="sng" algn="ctr">
+          <a:solidFill>
+            <a:schemeClr val="phClr"/>
+          </a:solidFill>
+          <a:prstDash val="solid"/>
+        </a:ln>
+      </a:lnStyleLst>
+      <a:effectStyleLst>
+        <a:effectStyle>
+          <a:effectLst>
+            <a:outerShdw blurRad="40000" dist="20000" dir="5400000" rotWithShape="0">
+              <a:srgbClr val="000000">
+                <a:alpha val="38000"/>
+              </a:srgbClr>
+            </a:outerShdw>
+          </a:effectLst>
+        </a:effectStyle>
+        <a:effectStyle>
+          <a:effectLst>
+            <a:outerShdw blurRad="40000" dist="23000" dir="5400000" rotWithShape="0">
+              <a:srgbClr val="000000">
+                <a:alpha val="35000"/>
+              </a:srgbClr>
+            </a:outerShdw>
+          </a:effectLst>
+        </a:effectStyle>
+        <a:effectStyle>
+          <a:effectLst>
+            <a:outerShdw blurRad="40000" dist="23000" dir="5400000" rotWithShape="0">
+              <a:srgbClr val="000000">
+                <a:alpha val="35000"/>
+              </a:srgbClr>
+            </a:outerShdw>
+          </a:effectLst>
+          <a:scene3d>
+            <a:camera prst="orthographicFront">
+              <a:rot lat="0" lon="0" rev="0"/>
+            </a:camera>
+            <a:lightRig rig="threePt" dir="t">
+              <a:rot lat="0" lon="0" rev="1200000"/>
+            </a:lightRig>
+          </a:scene3d>
+          <a:sp3d>
+            <a:bevelT w="63500" h="25400"/>
+          </a:sp3d>
+        </a:effectStyle>
+      </a:effectStyleLst>
+      <a:bgFillStyleLst>
+        <a:solidFill>
+          <a:schemeClr val="phClr"/>
+        </a:solidFill>
+        <a:gradFill rotWithShape="1">
+          <a:gsLst>
+            <a:gs pos="0">
+              <a:schemeClr val="phClr">
+                <a:tint val="40000"/>
+                <a:satMod val="350000"/>
+              </a:schemeClr>
+            </a:gs>
+            <a:gs pos="40000">
+              <a:schemeClr val="phClr">
+                <a:tint val="45000"/>
+                <a:shade val="99000"/>
+                <a:satMod val="350000"/>
+              </a:schemeClr>
+            </a:gs>
+            <a:gs pos="100000">
+              <a:schemeClr val="phClr">
+                <a:shade val="20000"/>
+                <a:satMod val="255000"/>
+              </a:schemeClr>
+            </a:gs>
+          </a:gsLst>
+          <a:path path="circle">
+            <a:fillToRect l="50000" t="-80000" r="50000" b="180000"/>
+          </a:path>
+        </a:gradFill>
+        <a:gradFill rotWithShape="1">
+          <a:gsLst>
+            <a:gs pos="0">
+              <a:schemeClr val="phClr">
+                <a:tint val="80000"/>
+                <a:satMod val="300000"/>
+              </a:schemeClr>
+            </a:gs>
+            <a:gs pos="100000">
+              <a:schemeClr val="phClr">
+                <a:shade val="30000"/>
+                <a:satMod val="200000"/>
+              </a:schemeClr>
+            </a:gs>
+          </a:gsLst>
+          <a:path path="circle">
+            <a:fillToRect l="50000" t="50000" r="50000" b="50000"/>
+          </a:path>
+        </a:gradFill>
+      </a:bgFillStyleLst>
+    </a:fmtScheme>
+  </a:themeElements>
+  <a:objectDefaults/>
+  <a:extraClrSchemeLst/>
+</a:theme>
 </file>
</xml_diff>

<commit_message>
Create 1st part of Facade presenation
- intro
- definition
- problem and solution
- structure
- example diagram

---
Test:
open Facade/Presentation/Facade.pptx

Signed-off-by: Polina Shlepakova <polinashlepakova@gmail.com>
</commit_message>
<xml_diff>
--- a/FactoryMethod/Presentation/FactoryMethod.pptx
+++ b/FactoryMethod/Presentation/FactoryMethod.pptx
@@ -9257,24 +9257,17 @@
                 <a:latin typeface="Courier New" panose="02070309020205020404" pitchFamily="49" charset="0"/>
                 <a:cs typeface="Courier New" panose="02070309020205020404" pitchFamily="49" charset="0"/>
               </a:rPr>
-              <a:t>git </a:t>
-            </a:r>
-            <a:r>
-              <a:rPr lang="en-US" sz="2800">
+              <a:t>git checkout </a:t>
+            </a:r>
+            <a:r>
+              <a:rPr lang="en-US" sz="2800" b="1" smtClean="0">
+                <a:solidFill>
+                  <a:schemeClr val="accent6"/>
+                </a:solidFill>
                 <a:latin typeface="Courier New" panose="02070309020205020404" pitchFamily="49" charset="0"/>
                 <a:cs typeface="Courier New" panose="02070309020205020404" pitchFamily="49" charset="0"/>
               </a:rPr>
-              <a:t>checkout </a:t>
-            </a:r>
-            <a:r>
-              <a:rPr lang="en-US" sz="2800" b="1" smtClean="0">
-                <a:solidFill>
-                  <a:schemeClr val="accent6"/>
-                </a:solidFill>
-                <a:latin typeface="Courier New" panose="02070309020205020404" pitchFamily="49" charset="0"/>
-                <a:cs typeface="Courier New" panose="02070309020205020404" pitchFamily="49" charset="0"/>
-              </a:rPr>
-              <a:t>d674ed9</a:t>
+              <a:t>1651c77</a:t>
             </a:r>
             <a:endParaRPr lang="ru-RU"/>
           </a:p>
@@ -9515,17 +9508,7 @@
                 <a:latin typeface="Courier New" panose="02070309020205020404" pitchFamily="49" charset="0"/>
                 <a:cs typeface="Courier New" panose="02070309020205020404" pitchFamily="49" charset="0"/>
               </a:rPr>
-              <a:t>Use Factory </a:t>
-            </a:r>
-            <a:r>
-              <a:rPr lang="en-US" b="1">
-                <a:solidFill>
-                  <a:schemeClr val="tx2"/>
-                </a:solidFill>
-                <a:latin typeface="Courier New" panose="02070309020205020404" pitchFamily="49" charset="0"/>
-                <a:cs typeface="Courier New" panose="02070309020205020404" pitchFamily="49" charset="0"/>
-              </a:rPr>
-              <a:t>Method </a:t>
+              <a:t>Use Factory Method </a:t>
             </a:r>
             <a:r>
               <a:rPr lang="en-US" b="1" smtClean="0">
@@ -10093,14 +10076,7 @@
                 <a:latin typeface="Courier New" panose="02070309020205020404" pitchFamily="49" charset="0"/>
                 <a:cs typeface="Courier New" panose="02070309020205020404" pitchFamily="49" charset="0"/>
               </a:rPr>
-              <a:t>Deliver water : 500 kg to Ukraine, Kyiv, st. Illinska, 2, 01010 by Truck #1 using the </a:t>
-            </a:r>
-            <a:r>
-              <a:rPr lang="en-US" sz="2800">
-                <a:latin typeface="Courier New" panose="02070309020205020404" pitchFamily="49" charset="0"/>
-                <a:cs typeface="Courier New" panose="02070309020205020404" pitchFamily="49" charset="0"/>
-              </a:rPr>
-              <a:t>road </a:t>
+              <a:t>Deliver water : 500 kg to Ukraine, Kyiv, st. Illinska, 2, 01010 by Truck #1 using the road </a:t>
             </a:r>
             <a:endParaRPr lang="en-US" sz="2800" smtClean="0">
               <a:latin typeface="Courier New" panose="02070309020205020404" pitchFamily="49" charset="0"/>
@@ -10384,24 +10360,17 @@
                 <a:latin typeface="Courier New" panose="02070309020205020404" pitchFamily="49" charset="0"/>
                 <a:cs typeface="Courier New" panose="02070309020205020404" pitchFamily="49" charset="0"/>
               </a:rPr>
-              <a:t>git </a:t>
-            </a:r>
-            <a:r>
-              <a:rPr lang="en-US" sz="2800">
+              <a:t>git checkout </a:t>
+            </a:r>
+            <a:r>
+              <a:rPr lang="en-US" sz="2800" b="1" smtClean="0">
+                <a:solidFill>
+                  <a:schemeClr val="accent6"/>
+                </a:solidFill>
                 <a:latin typeface="Courier New" panose="02070309020205020404" pitchFamily="49" charset="0"/>
                 <a:cs typeface="Courier New" panose="02070309020205020404" pitchFamily="49" charset="0"/>
               </a:rPr>
-              <a:t>checkout </a:t>
-            </a:r>
-            <a:r>
-              <a:rPr lang="en-US" sz="2800" b="1" smtClean="0">
-                <a:solidFill>
-                  <a:schemeClr val="accent6"/>
-                </a:solidFill>
-                <a:latin typeface="Courier New" panose="02070309020205020404" pitchFamily="49" charset="0"/>
-                <a:cs typeface="Courier New" panose="02070309020205020404" pitchFamily="49" charset="0"/>
-              </a:rPr>
-              <a:t>9a01748</a:t>
+              <a:t>ce47ef1</a:t>
             </a:r>
             <a:endParaRPr lang="ru-RU"/>
           </a:p>
@@ -10642,17 +10611,7 @@
                 <a:latin typeface="Courier New" panose="02070309020205020404" pitchFamily="49" charset="0"/>
                 <a:cs typeface="Courier New" panose="02070309020205020404" pitchFamily="49" charset="0"/>
               </a:rPr>
-              <a:t>Add Sea </a:t>
-            </a:r>
-            <a:r>
-              <a:rPr lang="en-US" sz="2800" b="1">
-                <a:solidFill>
-                  <a:schemeClr val="tx2"/>
-                </a:solidFill>
-                <a:latin typeface="Courier New" panose="02070309020205020404" pitchFamily="49" charset="0"/>
-                <a:cs typeface="Courier New" panose="02070309020205020404" pitchFamily="49" charset="0"/>
-              </a:rPr>
-              <a:t>logistics </a:t>
+              <a:t>Add Sea logistics </a:t>
             </a:r>
             <a:r>
               <a:rPr lang="en-US" sz="2800" b="1" smtClean="0">
@@ -11085,14 +11044,7 @@
                 <a:latin typeface="Courier New" panose="02070309020205020404" pitchFamily="49" charset="0"/>
                 <a:cs typeface="Courier New" panose="02070309020205020404" pitchFamily="49" charset="0"/>
               </a:rPr>
-              <a:t>water : 500 kg to Ukraine, Kyiv, st. Illinska, 2, 01010 by Truck #1 using the </a:t>
-            </a:r>
-            <a:r>
-              <a:rPr lang="en-US" sz="2800">
-                <a:latin typeface="Courier New" panose="02070309020205020404" pitchFamily="49" charset="0"/>
-                <a:cs typeface="Courier New" panose="02070309020205020404" pitchFamily="49" charset="0"/>
-              </a:rPr>
-              <a:t>road </a:t>
+              <a:t>water : 500 kg to Ukraine, Kyiv, st. Illinska, 2, 01010 by Truck #1 using the road </a:t>
             </a:r>
             <a:endParaRPr lang="en-US" sz="2800" smtClean="0">
               <a:latin typeface="Courier New" panose="02070309020205020404" pitchFamily="49" charset="0"/>
@@ -12891,17 +12843,7 @@
                   </a:schemeClr>
                 </a:solidFill>
               </a:rPr>
-              <a:t>ource: Design Patterns Explained Simply by Alexander Shvets, pg. </a:t>
-            </a:r>
-            <a:r>
-              <a:rPr lang="en-US" smtClean="0">
-                <a:solidFill>
-                  <a:schemeClr val="accent6">
-                    <a:lumMod val="75000"/>
-                  </a:schemeClr>
-                </a:solidFill>
-              </a:rPr>
-              <a:t>82</a:t>
+              <a:t>ource: Design Patterns Explained Simply by Alexander Shvets, pg. 82</a:t>
             </a:r>
             <a:endParaRPr lang="en-US" u="sng">
               <a:solidFill>
@@ -13276,17 +13218,7 @@
                   </a:schemeClr>
                 </a:solidFill>
               </a:rPr>
-              <a:t>ource: Design Patterns Explained Simply by Alexander Shvets, pg. </a:t>
-            </a:r>
-            <a:r>
-              <a:rPr lang="en-US" smtClean="0">
-                <a:solidFill>
-                  <a:schemeClr val="accent6">
-                    <a:lumMod val="75000"/>
-                  </a:schemeClr>
-                </a:solidFill>
-              </a:rPr>
-              <a:t>83</a:t>
+              <a:t>ource: Design Patterns Explained Simply by Alexander Shvets, pg. 83</a:t>
             </a:r>
             <a:endParaRPr lang="en-US" u="sng">
               <a:solidFill>
@@ -13594,17 +13526,7 @@
                   </a:schemeClr>
                 </a:solidFill>
               </a:rPr>
-              <a:t>ource: </a:t>
-            </a:r>
-            <a:r>
-              <a:rPr lang="en-US" smtClean="0">
-                <a:solidFill>
-                  <a:schemeClr val="accent6">
-                    <a:lumMod val="75000"/>
-                  </a:schemeClr>
-                </a:solidFill>
-              </a:rPr>
-              <a:t>GoF book, Factory Method, Related patterns</a:t>
+              <a:t>ource: GoF book, Factory Method, Related patterns</a:t>
             </a:r>
             <a:endParaRPr lang="en-US" u="sng">
               <a:solidFill>
@@ -13910,17 +13832,7 @@
                   </a:schemeClr>
                 </a:solidFill>
               </a:rPr>
-              <a:t>Source: Design Patterns Explained Simply by Alexander Shvets, pg</a:t>
-            </a:r>
-            <a:r>
-              <a:rPr lang="en-US">
-                <a:solidFill>
-                  <a:schemeClr val="accent6">
-                    <a:lumMod val="75000"/>
-                  </a:schemeClr>
-                </a:solidFill>
-              </a:rPr>
-              <a:t>. </a:t>
+              <a:t>Source: Design Patterns Explained Simply by Alexander Shvets, pg. </a:t>
             </a:r>
             <a:r>
               <a:rPr lang="en-US" smtClean="0">
@@ -14296,17 +14208,7 @@
                   </a:schemeClr>
                 </a:solidFill>
               </a:rPr>
-              <a:t>Source: Design Patterns Explained Simply by Alexander Shvets, pg</a:t>
-            </a:r>
-            <a:r>
-              <a:rPr lang="en-US">
-                <a:solidFill>
-                  <a:schemeClr val="accent6">
-                    <a:lumMod val="75000"/>
-                  </a:schemeClr>
-                </a:solidFill>
-              </a:rPr>
-              <a:t>. </a:t>
+              <a:t>Source: Design Patterns Explained Simply by Alexander Shvets, pg. </a:t>
             </a:r>
             <a:r>
               <a:rPr lang="en-US" smtClean="0">
@@ -14636,17 +14538,7 @@
                   </a:schemeClr>
                 </a:solidFill>
               </a:rPr>
-              <a:t>ource: </a:t>
-            </a:r>
-            <a:r>
-              <a:rPr lang="en-US" smtClean="0">
-                <a:solidFill>
-                  <a:schemeClr val="accent6">
-                    <a:lumMod val="75000"/>
-                  </a:schemeClr>
-                </a:solidFill>
-              </a:rPr>
-              <a:t>GoF book, Factory Method, Related patterns</a:t>
+              <a:t>ource: GoF book, Factory Method, Related patterns</a:t>
             </a:r>
             <a:endParaRPr lang="en-US" u="sng">
               <a:solidFill>
@@ -14837,11 +14729,7 @@
             </a:r>
             <a:r>
               <a:rPr lang="en-US" sz="3200"/>
-              <a:t>are usually called within</a:t>
-            </a:r>
-            <a:r>
-              <a:rPr lang="en-US" sz="3200"/>
-              <a:t> </a:t>
+              <a:t>are usually called within </a:t>
             </a:r>
             <a:r>
               <a:rPr lang="en-US" sz="3200" i="1">
@@ -14974,17 +14862,7 @@
                   </a:schemeClr>
                 </a:solidFill>
               </a:rPr>
-              <a:t>ource: </a:t>
-            </a:r>
-            <a:r>
-              <a:rPr lang="en-US" smtClean="0">
-                <a:solidFill>
-                  <a:schemeClr val="accent6">
-                    <a:lumMod val="75000"/>
-                  </a:schemeClr>
-                </a:solidFill>
-              </a:rPr>
-              <a:t>GoF book, Factory Method, Related patterns</a:t>
+              <a:t>ource: GoF book, Factory Method, Related patterns</a:t>
             </a:r>
             <a:endParaRPr lang="en-US" u="sng">
               <a:solidFill>
@@ -15175,11 +15053,7 @@
             </a:r>
             <a:r>
               <a:rPr lang="en-US" sz="3200"/>
-              <a:t> don't require subclassing Creator. However</a:t>
-            </a:r>
-            <a:r>
-              <a:rPr lang="en-US" sz="3200"/>
-              <a:t>, </a:t>
+              <a:t> don't require subclassing Creator. However, </a:t>
             </a:r>
             <a:r>
               <a:rPr lang="en-US" sz="3200" smtClean="0"/>
@@ -15257,17 +15131,7 @@
                   </a:schemeClr>
                 </a:solidFill>
               </a:rPr>
-              <a:t>Source: Design Patterns Explained Simply by Alexander Shvets, pg</a:t>
-            </a:r>
-            <a:r>
-              <a:rPr lang="en-US">
-                <a:solidFill>
-                  <a:schemeClr val="accent6">
-                    <a:lumMod val="75000"/>
-                  </a:schemeClr>
-                </a:solidFill>
-              </a:rPr>
-              <a:t>. </a:t>
+              <a:t>Source: Design Patterns Explained Simply by Alexander Shvets, pg. </a:t>
             </a:r>
             <a:r>
               <a:rPr lang="en-US" smtClean="0">
@@ -15423,17 +15287,7 @@
                   </a:schemeClr>
                 </a:solidFill>
               </a:rPr>
-              <a:t>ource</a:t>
-            </a:r>
-            <a:r>
-              <a:rPr lang="en-US" smtClean="0">
-                <a:solidFill>
-                  <a:schemeClr val="accent6">
-                    <a:lumMod val="75000"/>
-                  </a:schemeClr>
-                </a:solidFill>
-              </a:rPr>
-              <a:t>: Design Patterns Explained Simply by Alexander Shvets, pg. 70</a:t>
+              <a:t>ource: Design Patterns Explained Simply by Alexander Shvets, pg. 70</a:t>
             </a:r>
             <a:endParaRPr lang="en-US" u="sng">
               <a:solidFill>
@@ -15838,11 +15692,7 @@
           <a:p>
             <a:r>
               <a:rPr lang="en-US" sz="3200"/>
-              <a:t>Design Patterns Explained Simply by </a:t>
-            </a:r>
-            <a:r>
-              <a:rPr lang="en-US" sz="3200"/>
-              <a:t>Alexander </a:t>
+              <a:t>Design Patterns Explained Simply by Alexander </a:t>
             </a:r>
             <a:r>
               <a:rPr lang="en-US" sz="3200" smtClean="0"/>
@@ -15866,11 +15716,7 @@
             </a:r>
             <a:r>
               <a:rPr lang="en-US" sz="3200"/>
-              <a:t>Erich Gamma, Richard Helm, Ralph Johnson and </a:t>
-            </a:r>
-            <a:r>
-              <a:rPr lang="en-US" sz="3200"/>
-              <a:t>John </a:t>
+              <a:t>Erich Gamma, Richard Helm, Ralph Johnson and John </a:t>
             </a:r>
             <a:r>
               <a:rPr lang="en-US" sz="3200" smtClean="0"/>
@@ -16354,25 +16200,25 @@
                 <a:latin typeface="Courier New" panose="02070309020205020404" pitchFamily="49" charset="0"/>
                 <a:cs typeface="Courier New" panose="02070309020205020404" pitchFamily="49" charset="0"/>
               </a:rPr>
-              <a:t>git </a:t>
-            </a:r>
-            <a:r>
-              <a:rPr lang="en-US" sz="2800">
+              <a:t>git checkout </a:t>
+            </a:r>
+            <a:r>
+              <a:rPr lang="en-US" sz="2800" b="1" smtClean="0">
+                <a:solidFill>
+                  <a:schemeClr val="accent6"/>
+                </a:solidFill>
                 <a:latin typeface="Courier New" panose="02070309020205020404" pitchFamily="49" charset="0"/>
                 <a:cs typeface="Courier New" panose="02070309020205020404" pitchFamily="49" charset="0"/>
               </a:rPr>
-              <a:t>checkout </a:t>
-            </a:r>
-            <a:r>
-              <a:rPr lang="en-US" sz="2800" b="1" smtClean="0">
-                <a:solidFill>
-                  <a:schemeClr val="accent6"/>
-                </a:solidFill>
-                <a:latin typeface="Courier New" panose="02070309020205020404" pitchFamily="49" charset="0"/>
-                <a:cs typeface="Courier New" panose="02070309020205020404" pitchFamily="49" charset="0"/>
-              </a:rPr>
-              <a:t>1c87e96c</a:t>
-            </a:r>
+              <a:t>63a870b</a:t>
+            </a:r>
+            <a:endParaRPr lang="en-US" sz="2800" b="1" smtClean="0">
+              <a:solidFill>
+                <a:schemeClr val="accent6"/>
+              </a:solidFill>
+              <a:latin typeface="Courier New" panose="02070309020205020404" pitchFamily="49" charset="0"/>
+              <a:cs typeface="Courier New" panose="02070309020205020404" pitchFamily="49" charset="0"/>
+            </a:endParaRPr>
           </a:p>
         </p:txBody>
       </p:sp>
@@ -17031,14 +16877,7 @@
                 <a:latin typeface="Courier New" panose="02070309020205020404" pitchFamily="49" charset="0"/>
                 <a:cs typeface="Courier New" panose="02070309020205020404" pitchFamily="49" charset="0"/>
               </a:rPr>
-              <a:t>water : 500 kg to Ukraine, Kyiv, st. Illinska, 2, 01010 by Truck #</a:t>
-            </a:r>
-            <a:r>
-              <a:rPr lang="en-US">
-                <a:latin typeface="Courier New" panose="02070309020205020404" pitchFamily="49" charset="0"/>
-                <a:cs typeface="Courier New" panose="02070309020205020404" pitchFamily="49" charset="0"/>
-              </a:rPr>
-              <a:t>1 </a:t>
+              <a:t>water : 500 kg to Ukraine, Kyiv, st. Illinska, 2, 01010 by Truck #1 </a:t>
             </a:r>
             <a:endParaRPr lang="en-US" smtClean="0">
               <a:latin typeface="Courier New" panose="02070309020205020404" pitchFamily="49" charset="0"/>

</xml_diff>